<commit_message>
Updated presentation: text complete, design changes
</commit_message>
<xml_diff>
--- a/presentation/presentation.pptx
+++ b/presentation/presentation.pptx
@@ -108,6 +108,11 @@
       </a:defRPr>
     </a:lvl9pPr>
   </p:defaultTextStyle>
+  <p:extLst>
+    <p:ext uri="{EFAFB233-063F-42B5-8137-9DF3F51BA10A}">
+      <p15:sldGuideLst xmlns:p15="http://schemas.microsoft.com/office/powerpoint/2012/main"/>
+    </p:ext>
+  </p:extLst>
 </p:presentation>
 </file>
 
@@ -260,7 +265,7 @@
           <a:p>
             <a:fld id="{644C3592-46D0-4B34-920A-DE207CF84733}" type="datetimeFigureOut">
               <a:rPr lang="de-CH" smtClean="0"/>
-              <a:t>01.06.2021</a:t>
+              <a:t>03.06.2021</a:t>
             </a:fld>
             <a:endParaRPr lang="de-CH"/>
           </a:p>
@@ -460,7 +465,7 @@
           <a:p>
             <a:fld id="{644C3592-46D0-4B34-920A-DE207CF84733}" type="datetimeFigureOut">
               <a:rPr lang="de-CH" smtClean="0"/>
-              <a:t>01.06.2021</a:t>
+              <a:t>03.06.2021</a:t>
             </a:fld>
             <a:endParaRPr lang="de-CH"/>
           </a:p>
@@ -670,7 +675,7 @@
           <a:p>
             <a:fld id="{644C3592-46D0-4B34-920A-DE207CF84733}" type="datetimeFigureOut">
               <a:rPr lang="de-CH" smtClean="0"/>
-              <a:t>01.06.2021</a:t>
+              <a:t>03.06.2021</a:t>
             </a:fld>
             <a:endParaRPr lang="de-CH"/>
           </a:p>
@@ -870,7 +875,7 @@
           <a:p>
             <a:fld id="{644C3592-46D0-4B34-920A-DE207CF84733}" type="datetimeFigureOut">
               <a:rPr lang="de-CH" smtClean="0"/>
-              <a:t>01.06.2021</a:t>
+              <a:t>03.06.2021</a:t>
             </a:fld>
             <a:endParaRPr lang="de-CH"/>
           </a:p>
@@ -1146,7 +1151,7 @@
           <a:p>
             <a:fld id="{644C3592-46D0-4B34-920A-DE207CF84733}" type="datetimeFigureOut">
               <a:rPr lang="de-CH" smtClean="0"/>
-              <a:t>01.06.2021</a:t>
+              <a:t>03.06.2021</a:t>
             </a:fld>
             <a:endParaRPr lang="de-CH"/>
           </a:p>
@@ -1414,7 +1419,7 @@
           <a:p>
             <a:fld id="{644C3592-46D0-4B34-920A-DE207CF84733}" type="datetimeFigureOut">
               <a:rPr lang="de-CH" smtClean="0"/>
-              <a:t>01.06.2021</a:t>
+              <a:t>03.06.2021</a:t>
             </a:fld>
             <a:endParaRPr lang="de-CH"/>
           </a:p>
@@ -1829,7 +1834,7 @@
           <a:p>
             <a:fld id="{644C3592-46D0-4B34-920A-DE207CF84733}" type="datetimeFigureOut">
               <a:rPr lang="de-CH" smtClean="0"/>
-              <a:t>01.06.2021</a:t>
+              <a:t>03.06.2021</a:t>
             </a:fld>
             <a:endParaRPr lang="de-CH"/>
           </a:p>
@@ -1971,7 +1976,7 @@
           <a:p>
             <a:fld id="{644C3592-46D0-4B34-920A-DE207CF84733}" type="datetimeFigureOut">
               <a:rPr lang="de-CH" smtClean="0"/>
-              <a:t>01.06.2021</a:t>
+              <a:t>03.06.2021</a:t>
             </a:fld>
             <a:endParaRPr lang="de-CH"/>
           </a:p>
@@ -2084,7 +2089,7 @@
           <a:p>
             <a:fld id="{644C3592-46D0-4B34-920A-DE207CF84733}" type="datetimeFigureOut">
               <a:rPr lang="de-CH" smtClean="0"/>
-              <a:t>01.06.2021</a:t>
+              <a:t>03.06.2021</a:t>
             </a:fld>
             <a:endParaRPr lang="de-CH"/>
           </a:p>
@@ -2397,7 +2402,7 @@
           <a:p>
             <a:fld id="{644C3592-46D0-4B34-920A-DE207CF84733}" type="datetimeFigureOut">
               <a:rPr lang="de-CH" smtClean="0"/>
-              <a:t>01.06.2021</a:t>
+              <a:t>03.06.2021</a:t>
             </a:fld>
             <a:endParaRPr lang="de-CH"/>
           </a:p>
@@ -2686,7 +2691,7 @@
           <a:p>
             <a:fld id="{644C3592-46D0-4B34-920A-DE207CF84733}" type="datetimeFigureOut">
               <a:rPr lang="de-CH" smtClean="0"/>
-              <a:t>01.06.2021</a:t>
+              <a:t>03.06.2021</a:t>
             </a:fld>
             <a:endParaRPr lang="de-CH"/>
           </a:p>
@@ -2929,7 +2934,7 @@
           <a:p>
             <a:fld id="{644C3592-46D0-4B34-920A-DE207CF84733}" type="datetimeFigureOut">
               <a:rPr lang="de-CH" smtClean="0"/>
-              <a:t>01.06.2021</a:t>
+              <a:t>03.06.2021</a:t>
             </a:fld>
             <a:endParaRPr lang="de-CH"/>
           </a:p>
@@ -3335,7 +3340,10 @@
     <p:bg>
       <p:bgPr>
         <a:solidFill>
-          <a:schemeClr val="bg1"/>
+          <a:schemeClr val="bg1">
+            <a:tint val="95000"/>
+            <a:satMod val="170000"/>
+          </a:schemeClr>
         </a:solidFill>
         <a:effectLst/>
       </p:bgPr>
@@ -3354,12 +3362,99 @@
           <a:chExt cx="0" cy="0"/>
         </a:xfrm>
       </p:grpSpPr>
-      <p:sp useBgFill="1">
-        <p:nvSpPr>
-          <p:cNvPr id="9" name="Rectangle 8">
-            <a:extLst>
-              <a:ext uri="{FF2B5EF4-FFF2-40B4-BE49-F238E27FC236}">
-                <a16:creationId xmlns:a16="http://schemas.microsoft.com/office/drawing/2014/main" id="{657F69E0-C4B0-4BEC-A689-4F8D877F05D4}"/>
+      <p:sp>
+        <p:nvSpPr>
+          <p:cNvPr id="2" name="Titel 1">
+            <a:extLst>
+              <a:ext uri="{FF2B5EF4-FFF2-40B4-BE49-F238E27FC236}">
+                <a16:creationId xmlns:a16="http://schemas.microsoft.com/office/drawing/2014/main" id="{47220840-2554-4AF8-8387-60358B7EA67B}"/>
+              </a:ext>
+            </a:extLst>
+          </p:cNvPr>
+          <p:cNvSpPr>
+            <a:spLocks noGrp="1"/>
+          </p:cNvSpPr>
+          <p:nvPr>
+            <p:ph type="ctrTitle"/>
+          </p:nvPr>
+        </p:nvSpPr>
+        <p:spPr>
+          <a:xfrm>
+            <a:off x="7464614" y="1783959"/>
+            <a:ext cx="4087306" cy="2889114"/>
+          </a:xfrm>
+        </p:spPr>
+        <p:txBody>
+          <a:bodyPr vert="horz" lIns="91440" tIns="45720" rIns="91440" bIns="45720" rtlCol="0" anchor="b">
+            <a:normAutofit/>
+          </a:bodyPr>
+          <a:lstStyle/>
+          <a:p>
+            <a:pPr algn="l"/>
+            <a:r>
+              <a:rPr lang="en-US" sz="3800" b="1" dirty="0"/>
+              <a:t>Identifying nests and wallows based on spatiotemporal wild boar data</a:t>
+            </a:r>
+            <a:endParaRPr lang="en-US" sz="3800" dirty="0"/>
+          </a:p>
+        </p:txBody>
+      </p:sp>
+      <p:sp>
+        <p:nvSpPr>
+          <p:cNvPr id="3" name="Untertitel 2">
+            <a:extLst>
+              <a:ext uri="{FF2B5EF4-FFF2-40B4-BE49-F238E27FC236}">
+                <a16:creationId xmlns:a16="http://schemas.microsoft.com/office/drawing/2014/main" id="{E138326B-6828-4984-844B-6E8D9488BEA9}"/>
+              </a:ext>
+            </a:extLst>
+          </p:cNvPr>
+          <p:cNvSpPr>
+            <a:spLocks noGrp="1"/>
+          </p:cNvSpPr>
+          <p:nvPr>
+            <p:ph type="subTitle" idx="1"/>
+          </p:nvPr>
+        </p:nvSpPr>
+        <p:spPr>
+          <a:xfrm>
+            <a:off x="7464612" y="4750893"/>
+            <a:ext cx="4087305" cy="1147863"/>
+          </a:xfrm>
+        </p:spPr>
+        <p:txBody>
+          <a:bodyPr vert="horz" lIns="91440" tIns="45720" rIns="91440" bIns="45720" rtlCol="0" anchor="t">
+            <a:normAutofit/>
+          </a:bodyPr>
+          <a:lstStyle/>
+          <a:p>
+            <a:pPr algn="l"/>
+            <a:r>
+              <a:rPr lang="en-US" sz="1700" dirty="0"/>
+              <a:t>Patterns &amp; Trends in Environmental Data</a:t>
+            </a:r>
+          </a:p>
+          <a:p>
+            <a:pPr algn="l"/>
+            <a:r>
+              <a:rPr lang="en-US" sz="1700" dirty="0"/>
+              <a:t>MSc ENR ZHAW FS21 </a:t>
+            </a:r>
+          </a:p>
+          <a:p>
+            <a:pPr algn="l"/>
+            <a:r>
+              <a:rPr lang="en-US" sz="1700" dirty="0"/>
+              <a:t>Yves Gubelmann &amp; Tobias Wildhaber</a:t>
+            </a:r>
+          </a:p>
+        </p:txBody>
+      </p:sp>
+      <p:sp>
+        <p:nvSpPr>
+          <p:cNvPr id="18" name="Freeform: Shape 15">
+            <a:extLst>
+              <a:ext uri="{FF2B5EF4-FFF2-40B4-BE49-F238E27FC236}">
+                <a16:creationId xmlns:a16="http://schemas.microsoft.com/office/drawing/2014/main" id="{E49CC64F-7275-4E33-961B-0C5CDC439875}"/>
               </a:ext>
               <a:ext uri="{C183D7F6-B498-43B3-948B-1728B52AA6E4}">
                 <adec:decorative xmlns:adec="http://schemas.microsoft.com/office/drawing/2017/decorative" val="1"/>
@@ -3378,13 +3473,89 @@
           </p:nvPr>
         </p:nvSpPr>
         <p:spPr>
-          <a:xfrm>
-            <a:off x="0" y="0"/>
-            <a:ext cx="12188952" cy="6858000"/>
+          <a:xfrm flipH="1" flipV="1">
+            <a:off x="1" y="0"/>
+            <a:ext cx="7188051" cy="6858000"/>
           </a:xfrm>
-          <a:prstGeom prst="rect">
+          <a:custGeom>
             <a:avLst/>
-          </a:prstGeom>
+            <a:gdLst>
+              <a:gd name="connsiteX0" fmla="*/ 7188051 w 7188051"/>
+              <a:gd name="connsiteY0" fmla="*/ 6858000 h 6858000"/>
+              <a:gd name="connsiteX1" fmla="*/ 108694 w 7188051"/>
+              <a:gd name="connsiteY1" fmla="*/ 6858000 h 6858000"/>
+              <a:gd name="connsiteX2" fmla="*/ 79127 w 7188051"/>
+              <a:gd name="connsiteY2" fmla="*/ 6681235 h 6858000"/>
+              <a:gd name="connsiteX3" fmla="*/ 0 w 7188051"/>
+              <a:gd name="connsiteY3" fmla="*/ 5565888 h 6858000"/>
+              <a:gd name="connsiteX4" fmla="*/ 2190696 w 7188051"/>
+              <a:gd name="connsiteY4" fmla="*/ 145339 h 6858000"/>
+              <a:gd name="connsiteX5" fmla="*/ 2339431 w 7188051"/>
+              <a:gd name="connsiteY5" fmla="*/ 0 h 6858000"/>
+              <a:gd name="connsiteX6" fmla="*/ 7188051 w 7188051"/>
+              <a:gd name="connsiteY6" fmla="*/ 0 h 6858000"/>
+            </a:gdLst>
+            <a:ahLst/>
+            <a:cxnLst>
+              <a:cxn ang="0">
+                <a:pos x="connsiteX0" y="connsiteY0"/>
+              </a:cxn>
+              <a:cxn ang="0">
+                <a:pos x="connsiteX1" y="connsiteY1"/>
+              </a:cxn>
+              <a:cxn ang="0">
+                <a:pos x="connsiteX2" y="connsiteY2"/>
+              </a:cxn>
+              <a:cxn ang="0">
+                <a:pos x="connsiteX3" y="connsiteY3"/>
+              </a:cxn>
+              <a:cxn ang="0">
+                <a:pos x="connsiteX4" y="connsiteY4"/>
+              </a:cxn>
+              <a:cxn ang="0">
+                <a:pos x="connsiteX5" y="connsiteY5"/>
+              </a:cxn>
+              <a:cxn ang="0">
+                <a:pos x="connsiteX6" y="connsiteY6"/>
+              </a:cxn>
+            </a:cxnLst>
+            <a:rect l="l" t="t" r="r" b="b"/>
+            <a:pathLst>
+              <a:path w="7188051" h="6858000">
+                <a:moveTo>
+                  <a:pt x="7188051" y="6858000"/>
+                </a:moveTo>
+                <a:lnTo>
+                  <a:pt x="108694" y="6858000"/>
+                </a:lnTo>
+                <a:lnTo>
+                  <a:pt x="79127" y="6681235"/>
+                </a:lnTo>
+                <a:cubicBezTo>
+                  <a:pt x="26981" y="6316967"/>
+                  <a:pt x="0" y="5944579"/>
+                  <a:pt x="0" y="5565888"/>
+                </a:cubicBezTo>
+                <a:cubicBezTo>
+                  <a:pt x="0" y="3459953"/>
+                  <a:pt x="834428" y="1548908"/>
+                  <a:pt x="2190696" y="145339"/>
+                </a:cubicBezTo>
+                <a:lnTo>
+                  <a:pt x="2339431" y="0"/>
+                </a:lnTo>
+                <a:lnTo>
+                  <a:pt x="7188051" y="0"/>
+                </a:lnTo>
+                <a:close/>
+              </a:path>
+            </a:pathLst>
+          </a:custGeom>
+          <a:solidFill>
+            <a:schemeClr val="tx1">
+              <a:alpha val="80000"/>
+            </a:schemeClr>
+          </a:solidFill>
           <a:ln>
             <a:noFill/>
           </a:ln>
@@ -3406,7 +3577,9 @@
           </a:fontRef>
         </p:style>
         <p:txBody>
-          <a:bodyPr rtlCol="0" anchor="ctr"/>
+          <a:bodyPr wrap="square" rtlCol="0" anchor="ctr">
+            <a:noAutofit/>
+          </a:bodyPr>
           <a:lstStyle/>
           <a:p>
             <a:pPr algn="ctr"/>
@@ -3430,90 +3603,175 @@
         </p:nvPicPr>
         <p:blipFill rotWithShape="1">
           <a:blip r:embed="rId2">
-            <a:alphaModFix amt="50000"/>
             <a:extLst>
               <a:ext uri="{28A0092B-C50C-407E-A947-70E740481C1C}">
                 <a14:useLocalDpi xmlns:a14="http://schemas.microsoft.com/office/drawing/2010/main" val="0"/>
               </a:ext>
             </a:extLst>
           </a:blip>
-          <a:srcRect t="6971" r="-1" b="8102"/>
+          <a:srcRect l="12130" r="19972" b="-1"/>
           <a:stretch/>
         </p:blipFill>
         <p:spPr>
           <a:xfrm>
-            <a:off x="20" y="10"/>
-            <a:ext cx="12188930" cy="6857990"/>
+            <a:off x="1" y="10"/>
+            <a:ext cx="7028495" cy="6857990"/>
+          </a:xfrm>
+          <a:custGeom>
+            <a:avLst/>
+            <a:gdLst/>
+            <a:ahLst/>
+            <a:cxnLst/>
+            <a:rect l="l" t="t" r="r" b="b"/>
+            <a:pathLst>
+              <a:path w="7028495" h="6858000">
+                <a:moveTo>
+                  <a:pt x="0" y="0"/>
+                </a:moveTo>
+                <a:lnTo>
+                  <a:pt x="6915668" y="0"/>
+                </a:lnTo>
+                <a:lnTo>
+                  <a:pt x="6952411" y="219663"/>
+                </a:lnTo>
+                <a:cubicBezTo>
+                  <a:pt x="7002551" y="569921"/>
+                  <a:pt x="7028495" y="927986"/>
+                  <a:pt x="7028495" y="1292112"/>
+                </a:cubicBezTo>
+                <a:cubicBezTo>
+                  <a:pt x="7028495" y="3343346"/>
+                  <a:pt x="6205186" y="5202289"/>
+                  <a:pt x="4870994" y="6556512"/>
+                </a:cubicBezTo>
+                <a:lnTo>
+                  <a:pt x="4556185" y="6858000"/>
+                </a:lnTo>
+                <a:lnTo>
+                  <a:pt x="0" y="6858000"/>
+                </a:lnTo>
+                <a:close/>
+              </a:path>
+            </a:pathLst>
+          </a:custGeom>
+        </p:spPr>
+      </p:pic>
+      <p:sp>
+        <p:nvSpPr>
+          <p:cNvPr id="5" name="Rechteck 4">
+            <a:extLst>
+              <a:ext uri="{FF2B5EF4-FFF2-40B4-BE49-F238E27FC236}">
+                <a16:creationId xmlns:a16="http://schemas.microsoft.com/office/drawing/2014/main" id="{954F8563-AC4C-400C-83FA-368F0A889936}"/>
+              </a:ext>
+            </a:extLst>
+          </p:cNvPr>
+          <p:cNvSpPr/>
+          <p:nvPr/>
+        </p:nvSpPr>
+        <p:spPr>
+          <a:xfrm>
+            <a:off x="6636470" y="6380936"/>
+            <a:ext cx="11550883" cy="477054"/>
           </a:xfrm>
           <a:prstGeom prst="rect">
             <a:avLst/>
           </a:prstGeom>
         </p:spPr>
-      </p:pic>
-      <p:sp>
-        <p:nvSpPr>
-          <p:cNvPr id="2" name="Titel 1">
-            <a:extLst>
-              <a:ext uri="{FF2B5EF4-FFF2-40B4-BE49-F238E27FC236}">
-                <a16:creationId xmlns:a16="http://schemas.microsoft.com/office/drawing/2014/main" id="{47220840-2554-4AF8-8387-60358B7EA67B}"/>
-              </a:ext>
-            </a:extLst>
-          </p:cNvPr>
-          <p:cNvSpPr>
-            <a:spLocks noGrp="1"/>
-          </p:cNvSpPr>
-          <p:nvPr>
-            <p:ph type="ctrTitle"/>
-          </p:nvPr>
-        </p:nvSpPr>
-        <p:spPr>
-          <a:xfrm>
-            <a:off x="1524000" y="1122363"/>
-            <a:ext cx="9144000" cy="3063240"/>
-          </a:xfrm>
-        </p:spPr>
-        <p:txBody>
-          <a:bodyPr>
-            <a:normAutofit/>
+        <p:txBody>
+          <a:bodyPr wrap="square">
+            <a:spAutoFit/>
           </a:bodyPr>
           <a:lstStyle/>
           <a:p>
-            <a:r>
-              <a:rPr lang="en-GB" sz="5600" b="1" dirty="0">
+            <a:pPr>
+              <a:spcAft>
+                <a:spcPts val="600"/>
+              </a:spcAft>
+            </a:pPr>
+            <a:endParaRPr lang="de-CH" sz="1000" dirty="0">
+              <a:solidFill>
+                <a:srgbClr val="FFFFFF"/>
+              </a:solidFill>
+            </a:endParaRPr>
+          </a:p>
+          <a:p>
+            <a:pPr>
+              <a:spcAft>
+                <a:spcPts val="600"/>
+              </a:spcAft>
+            </a:pPr>
+            <a:r>
+              <a:rPr lang="de-CH" sz="1000" dirty="0">
                 <a:solidFill>
                   <a:srgbClr val="FFFFFF"/>
                 </a:solidFill>
               </a:rPr>
-              <a:t>Identifying nests and swallows based on spatiotemporal wild boar data</a:t>
-            </a:r>
-            <a:endParaRPr lang="de-CH" sz="5600" dirty="0">
-              <a:solidFill>
-                <a:srgbClr val="FFFFFF"/>
-              </a:solidFill>
-            </a:endParaRPr>
-          </a:p>
-        </p:txBody>
-      </p:sp>
-      <p:sp>
-        <p:nvSpPr>
-          <p:cNvPr id="3" name="Untertitel 2">
-            <a:extLst>
-              <a:ext uri="{FF2B5EF4-FFF2-40B4-BE49-F238E27FC236}">
-                <a16:creationId xmlns:a16="http://schemas.microsoft.com/office/drawing/2014/main" id="{E138326B-6828-4984-844B-6E8D9488BEA9}"/>
-              </a:ext>
-            </a:extLst>
-          </p:cNvPr>
-          <p:cNvSpPr>
-            <a:spLocks noGrp="1"/>
-          </p:cNvSpPr>
-          <p:nvPr>
-            <p:ph type="subTitle" idx="1"/>
+              <a:t>Source: https://www.noble.org/globalassets/images/news/ag-publications/nf-wf-10-01/hog-wallow.jpg</a:t>
+            </a:r>
+          </a:p>
+        </p:txBody>
+      </p:sp>
+    </p:spTree>
+    <p:extLst>
+      <p:ext uri="{BB962C8B-B14F-4D97-AF65-F5344CB8AC3E}">
+        <p14:creationId xmlns:p14="http://schemas.microsoft.com/office/powerpoint/2010/main" val="933474705"/>
+      </p:ext>
+    </p:extLst>
+  </p:cSld>
+  <p:clrMapOvr>
+    <a:overrideClrMapping bg1="dk1" tx1="lt1" bg2="dk2" tx2="lt2" accent1="accent1" accent2="accent2" accent3="accent3" accent4="accent4" accent5="accent5" accent6="accent6" hlink="hlink" folHlink="folHlink"/>
+  </p:clrMapOvr>
+</p:sld>
+</file>
+
+<file path=ppt/slides/slide2.xml><?xml version="1.0" encoding="utf-8"?>
+<p:sld xmlns:a="http://schemas.openxmlformats.org/drawingml/2006/main" xmlns:r="http://schemas.openxmlformats.org/officeDocument/2006/relationships" xmlns:p="http://schemas.openxmlformats.org/presentationml/2006/main">
+  <p:cSld>
+    <p:bg>
+      <p:bgPr>
+        <a:solidFill>
+          <a:schemeClr val="bg1">
+            <a:tint val="95000"/>
+            <a:satMod val="170000"/>
+          </a:schemeClr>
+        </a:solidFill>
+        <a:effectLst/>
+      </p:bgPr>
+    </p:bg>
+    <p:spTree>
+      <p:nvGrpSpPr>
+        <p:cNvPr id="1" name=""/>
+        <p:cNvGrpSpPr/>
+        <p:nvPr/>
+      </p:nvGrpSpPr>
+      <p:grpSpPr>
+        <a:xfrm>
+          <a:off x="0" y="0"/>
+          <a:ext cx="0" cy="0"/>
+          <a:chOff x="0" y="0"/>
+          <a:chExt cx="0" cy="0"/>
+        </a:xfrm>
+      </p:grpSpPr>
+      <p:sp>
+        <p:nvSpPr>
+          <p:cNvPr id="2" name="Titel 1">
+            <a:extLst>
+              <a:ext uri="{FF2B5EF4-FFF2-40B4-BE49-F238E27FC236}">
+                <a16:creationId xmlns:a16="http://schemas.microsoft.com/office/drawing/2014/main" id="{10C3736A-78E0-4C9B-9995-2A4FB2039878}"/>
+              </a:ext>
+            </a:extLst>
+          </p:cNvPr>
+          <p:cNvSpPr>
+            <a:spLocks noGrp="1"/>
+          </p:cNvSpPr>
+          <p:nvPr>
+            <p:ph type="title"/>
           </p:nvPr>
         </p:nvSpPr>
         <p:spPr>
           <a:xfrm>
-            <a:off x="1527048" y="4599432"/>
-            <a:ext cx="9144000" cy="1536192"/>
+            <a:off x="801097" y="480906"/>
+            <a:ext cx="6387102" cy="1325563"/>
           </a:xfrm>
         </p:spPr>
         <p:txBody>
@@ -3523,50 +3781,154 @@
           <a:lstStyle/>
           <a:p>
             <a:r>
-              <a:rPr lang="de-CH" dirty="0">
-                <a:solidFill>
-                  <a:srgbClr val="FFFFFF"/>
-                </a:solidFill>
+              <a:rPr lang="de-DE" dirty="0" err="1"/>
+              <a:t>Context</a:t>
+            </a:r>
+            <a:endParaRPr lang="de-CH" dirty="0"/>
+          </a:p>
+        </p:txBody>
+      </p:sp>
+      <p:sp>
+        <p:nvSpPr>
+          <p:cNvPr id="3" name="Inhaltsplatzhalter 2">
+            <a:extLst>
+              <a:ext uri="{FF2B5EF4-FFF2-40B4-BE49-F238E27FC236}">
+                <a16:creationId xmlns:a16="http://schemas.microsoft.com/office/drawing/2014/main" id="{E3A0EFD4-1EF2-4E90-81B7-2033FCC46013}"/>
+              </a:ext>
+            </a:extLst>
+          </p:cNvPr>
+          <p:cNvSpPr>
+            <a:spLocks noGrp="1"/>
+          </p:cNvSpPr>
+          <p:nvPr>
+            <p:ph idx="1"/>
+          </p:nvPr>
+        </p:nvSpPr>
+        <p:spPr>
+          <a:xfrm>
+            <a:off x="805542" y="1623060"/>
+            <a:ext cx="6382657" cy="4202705"/>
+          </a:xfrm>
+        </p:spPr>
+        <p:txBody>
+          <a:bodyPr anchor="t">
+            <a:noAutofit/>
+          </a:bodyPr>
+          <a:lstStyle/>
+          <a:p>
+            <a:pPr marL="0" indent="0">
+              <a:buNone/>
+            </a:pPr>
+            <a:r>
+              <a:rPr lang="en-GB" sz="1800" dirty="0">
+                <a:effectLst/>
+                <a:latin typeface="Calibri" panose="020F0502020204030204" pitchFamily="34" charset="0"/>
+                <a:ea typeface="Calibri" panose="020F0502020204030204" pitchFamily="34" charset="0"/>
+                <a:cs typeface="Times New Roman" panose="02020603050405020304" pitchFamily="18" charset="0"/>
               </a:rPr>
-              <a:t>Patterns &amp; Trends in Environmental Data</a:t>
-            </a:r>
-          </a:p>
-          <a:p>
-            <a:r>
-              <a:rPr lang="de-CH" dirty="0" err="1">
-                <a:solidFill>
-                  <a:srgbClr val="FFFFFF"/>
-                </a:solidFill>
+              <a:t>Understanding the selection of resting places like nests and wallows build the basis for effective management measures to prevent </a:t>
+            </a:r>
+            <a:r>
+              <a:rPr lang="en-GB" sz="1800" dirty="0" err="1">
+                <a:effectLst/>
+                <a:latin typeface="Calibri" panose="020F0502020204030204" pitchFamily="34" charset="0"/>
+                <a:ea typeface="Calibri" panose="020F0502020204030204" pitchFamily="34" charset="0"/>
+                <a:cs typeface="Times New Roman" panose="02020603050405020304" pitchFamily="18" charset="0"/>
               </a:rPr>
-              <a:t>MSc</a:t>
-            </a:r>
-            <a:r>
-              <a:rPr lang="de-CH" dirty="0">
-                <a:solidFill>
-                  <a:srgbClr val="FFFFFF"/>
-                </a:solidFill>
+              <a:t>wildboar</a:t>
+            </a:r>
+            <a:r>
+              <a:rPr lang="en-GB" sz="1800" dirty="0">
+                <a:effectLst/>
+                <a:latin typeface="Calibri" panose="020F0502020204030204" pitchFamily="34" charset="0"/>
+                <a:ea typeface="Calibri" panose="020F0502020204030204" pitchFamily="34" charset="0"/>
+                <a:cs typeface="Times New Roman" panose="02020603050405020304" pitchFamily="18" charset="0"/>
               </a:rPr>
-              <a:t> IUNR ZHAW</a:t>
-            </a:r>
-          </a:p>
-          <a:p>
-            <a:r>
-              <a:rPr lang="de-CH" dirty="0">
-                <a:solidFill>
-                  <a:srgbClr val="FFFFFF"/>
-                </a:solidFill>
+              <a:t> damages in </a:t>
+            </a:r>
+            <a:r>
+              <a:rPr lang="en-GB" sz="1800" dirty="0" err="1">
+                <a:effectLst/>
+                <a:latin typeface="Calibri" panose="020F0502020204030204" pitchFamily="34" charset="0"/>
+                <a:ea typeface="Calibri" panose="020F0502020204030204" pitchFamily="34" charset="0"/>
+                <a:cs typeface="Times New Roman" panose="02020603050405020304" pitchFamily="18" charset="0"/>
               </a:rPr>
-              <a:t>FS21 </a:t>
-            </a:r>
-          </a:p>
-        </p:txBody>
-      </p:sp>
-      <p:sp>
-        <p:nvSpPr>
-          <p:cNvPr id="11" name="sketchy line">
-            <a:extLst>
-              <a:ext uri="{FF2B5EF4-FFF2-40B4-BE49-F238E27FC236}">
-                <a16:creationId xmlns:a16="http://schemas.microsoft.com/office/drawing/2014/main" id="{9F6380B4-6A1C-481E-8408-B4E6C75B9B81}"/>
+              <a:t>agriculutre</a:t>
+            </a:r>
+            <a:r>
+              <a:rPr lang="en-GB" sz="1800" dirty="0">
+                <a:effectLst/>
+                <a:latin typeface="Calibri" panose="020F0502020204030204" pitchFamily="34" charset="0"/>
+                <a:ea typeface="Calibri" panose="020F0502020204030204" pitchFamily="34" charset="0"/>
+                <a:cs typeface="Times New Roman" panose="02020603050405020304" pitchFamily="18" charset="0"/>
+              </a:rPr>
+              <a:t>.</a:t>
+            </a:r>
+          </a:p>
+          <a:p>
+            <a:endParaRPr lang="en-US" sz="1800" dirty="0"/>
+          </a:p>
+          <a:p>
+            <a:pPr marL="0" indent="0">
+              <a:buNone/>
+            </a:pPr>
+            <a:r>
+              <a:rPr lang="en-GB" sz="1800" dirty="0"/>
+              <a:t>Used data</a:t>
+            </a:r>
+          </a:p>
+          <a:p>
+            <a:r>
+              <a:rPr lang="en-GB" sz="1800" dirty="0"/>
+              <a:t>Wild boar movement data and metadata¹</a:t>
+            </a:r>
+          </a:p>
+          <a:p>
+            <a:r>
+              <a:rPr lang="en-GB" sz="1800" dirty="0"/>
+              <a:t>Field and vegetation type of surroundings¹</a:t>
+            </a:r>
+          </a:p>
+          <a:p>
+            <a:r>
+              <a:rPr lang="en-GB" sz="1800" dirty="0"/>
+              <a:t>Area statistics and vegetation height²</a:t>
+            </a:r>
+          </a:p>
+          <a:p>
+            <a:endParaRPr lang="en-GB" sz="1800" dirty="0"/>
+          </a:p>
+          <a:p>
+            <a:pPr marL="0" indent="0">
+              <a:buNone/>
+            </a:pPr>
+            <a:r>
+              <a:rPr lang="en-GB" sz="1800" dirty="0"/>
+              <a:t>¹Retrieved from ZHAW research project "Prevention of Wild Boar Damage in Agriculture“ </a:t>
+            </a:r>
+          </a:p>
+          <a:p>
+            <a:pPr marL="0" indent="0">
+              <a:buNone/>
+            </a:pPr>
+            <a:r>
+              <a:rPr lang="en-GB" sz="1800" dirty="0"/>
+              <a:t>²Retrieved from </a:t>
+            </a:r>
+            <a:r>
+              <a:rPr lang="en-GB" sz="1800" dirty="0" err="1"/>
+              <a:t>swisstopo</a:t>
+            </a:r>
+            <a:endParaRPr lang="en-GB" sz="1800" dirty="0"/>
+          </a:p>
+        </p:txBody>
+      </p:sp>
+      <p:sp>
+        <p:nvSpPr>
+          <p:cNvPr id="23" name="Freeform: Shape 22">
+            <a:extLst>
+              <a:ext uri="{FF2B5EF4-FFF2-40B4-BE49-F238E27FC236}">
+                <a16:creationId xmlns:a16="http://schemas.microsoft.com/office/drawing/2014/main" id="{2C6A2225-94AF-4BC4-98F4-77746E7B10A9}"/>
               </a:ext>
               <a:ext uri="{C183D7F6-B498-43B3-948B-1728B52AA6E4}">
                 <adec:decorative xmlns:adec="http://schemas.microsoft.com/office/drawing/2017/decorative" val="1"/>
@@ -3586,46 +3948,1788 @@
         </p:nvSpPr>
         <p:spPr>
           <a:xfrm>
-            <a:off x="3974206" y="4368623"/>
-            <a:ext cx="4243589" cy="18288"/>
+            <a:off x="7525108" y="1"/>
+            <a:ext cx="4666892" cy="3612937"/>
           </a:xfrm>
           <a:custGeom>
             <a:avLst/>
             <a:gdLst>
-              <a:gd name="connsiteX0" fmla="*/ 0 w 4243589"/>
-              <a:gd name="connsiteY0" fmla="*/ 0 h 18288"/>
-              <a:gd name="connsiteX1" fmla="*/ 478919 w 4243589"/>
-              <a:gd name="connsiteY1" fmla="*/ 0 h 18288"/>
-              <a:gd name="connsiteX2" fmla="*/ 957839 w 4243589"/>
-              <a:gd name="connsiteY2" fmla="*/ 0 h 18288"/>
-              <a:gd name="connsiteX3" fmla="*/ 1521630 w 4243589"/>
-              <a:gd name="connsiteY3" fmla="*/ 0 h 18288"/>
-              <a:gd name="connsiteX4" fmla="*/ 2212729 w 4243589"/>
-              <a:gd name="connsiteY4" fmla="*/ 0 h 18288"/>
-              <a:gd name="connsiteX5" fmla="*/ 2734084 w 4243589"/>
-              <a:gd name="connsiteY5" fmla="*/ 0 h 18288"/>
-              <a:gd name="connsiteX6" fmla="*/ 3255439 w 4243589"/>
-              <a:gd name="connsiteY6" fmla="*/ 0 h 18288"/>
-              <a:gd name="connsiteX7" fmla="*/ 4243589 w 4243589"/>
-              <a:gd name="connsiteY7" fmla="*/ 0 h 18288"/>
-              <a:gd name="connsiteX8" fmla="*/ 4243589 w 4243589"/>
-              <a:gd name="connsiteY8" fmla="*/ 18288 h 18288"/>
-              <a:gd name="connsiteX9" fmla="*/ 3594926 w 4243589"/>
-              <a:gd name="connsiteY9" fmla="*/ 18288 h 18288"/>
-              <a:gd name="connsiteX10" fmla="*/ 3073571 w 4243589"/>
-              <a:gd name="connsiteY10" fmla="*/ 18288 h 18288"/>
-              <a:gd name="connsiteX11" fmla="*/ 2552216 w 4243589"/>
-              <a:gd name="connsiteY11" fmla="*/ 18288 h 18288"/>
-              <a:gd name="connsiteX12" fmla="*/ 1903553 w 4243589"/>
-              <a:gd name="connsiteY12" fmla="*/ 18288 h 18288"/>
-              <a:gd name="connsiteX13" fmla="*/ 1212454 w 4243589"/>
-              <a:gd name="connsiteY13" fmla="*/ 18288 h 18288"/>
-              <a:gd name="connsiteX14" fmla="*/ 733535 w 4243589"/>
-              <a:gd name="connsiteY14" fmla="*/ 18288 h 18288"/>
-              <a:gd name="connsiteX15" fmla="*/ 0 w 4243589"/>
-              <a:gd name="connsiteY15" fmla="*/ 18288 h 18288"/>
-              <a:gd name="connsiteX16" fmla="*/ 0 w 4243589"/>
-              <a:gd name="connsiteY16" fmla="*/ 0 h 18288"/>
+              <a:gd name="connsiteX0" fmla="*/ 192227 w 4666892"/>
+              <a:gd name="connsiteY0" fmla="*/ 0 h 3612937"/>
+              <a:gd name="connsiteX1" fmla="*/ 4666892 w 4666892"/>
+              <a:gd name="connsiteY1" fmla="*/ 0 h 3612937"/>
+              <a:gd name="connsiteX2" fmla="*/ 4666892 w 4666892"/>
+              <a:gd name="connsiteY2" fmla="*/ 2643684 h 3612937"/>
+              <a:gd name="connsiteX3" fmla="*/ 4657487 w 4666892"/>
+              <a:gd name="connsiteY3" fmla="*/ 2656262 h 3612937"/>
+              <a:gd name="connsiteX4" fmla="*/ 2628900 w 4666892"/>
+              <a:gd name="connsiteY4" fmla="*/ 3612937 h 3612937"/>
+              <a:gd name="connsiteX5" fmla="*/ 0 w 4666892"/>
+              <a:gd name="connsiteY5" fmla="*/ 984037 h 3612937"/>
+              <a:gd name="connsiteX6" fmla="*/ 118190 w 4666892"/>
+              <a:gd name="connsiteY6" fmla="*/ 202283 h 3612937"/>
+            </a:gdLst>
+            <a:ahLst/>
+            <a:cxnLst>
+              <a:cxn ang="0">
+                <a:pos x="connsiteX0" y="connsiteY0"/>
+              </a:cxn>
+              <a:cxn ang="0">
+                <a:pos x="connsiteX1" y="connsiteY1"/>
+              </a:cxn>
+              <a:cxn ang="0">
+                <a:pos x="connsiteX2" y="connsiteY2"/>
+              </a:cxn>
+              <a:cxn ang="0">
+                <a:pos x="connsiteX3" y="connsiteY3"/>
+              </a:cxn>
+              <a:cxn ang="0">
+                <a:pos x="connsiteX4" y="connsiteY4"/>
+              </a:cxn>
+              <a:cxn ang="0">
+                <a:pos x="connsiteX5" y="connsiteY5"/>
+              </a:cxn>
+              <a:cxn ang="0">
+                <a:pos x="connsiteX6" y="connsiteY6"/>
+              </a:cxn>
+            </a:cxnLst>
+            <a:rect l="l" t="t" r="r" b="b"/>
+            <a:pathLst>
+              <a:path w="4666892" h="3612937">
+                <a:moveTo>
+                  <a:pt x="192227" y="0"/>
+                </a:moveTo>
+                <a:lnTo>
+                  <a:pt x="4666892" y="0"/>
+                </a:lnTo>
+                <a:lnTo>
+                  <a:pt x="4666892" y="2643684"/>
+                </a:lnTo>
+                <a:lnTo>
+                  <a:pt x="4657487" y="2656262"/>
+                </a:lnTo>
+                <a:cubicBezTo>
+                  <a:pt x="4175308" y="3240527"/>
+                  <a:pt x="3445594" y="3612937"/>
+                  <a:pt x="2628900" y="3612937"/>
+                </a:cubicBezTo>
+                <a:cubicBezTo>
+                  <a:pt x="1176999" y="3612937"/>
+                  <a:pt x="0" y="2435938"/>
+                  <a:pt x="0" y="984037"/>
+                </a:cubicBezTo>
+                <a:cubicBezTo>
+                  <a:pt x="0" y="711806"/>
+                  <a:pt x="41379" y="449239"/>
+                  <a:pt x="118190" y="202283"/>
+                </a:cubicBezTo>
+                <a:close/>
+              </a:path>
+            </a:pathLst>
+          </a:custGeom>
+          <a:solidFill>
+            <a:srgbClr val="FFFFFF">
+              <a:alpha val="80000"/>
+            </a:srgbClr>
+          </a:solidFill>
+          <a:ln>
+            <a:noFill/>
+          </a:ln>
+        </p:spPr>
+        <p:style>
+          <a:lnRef idx="2">
+            <a:schemeClr val="accent1">
+              <a:shade val="50000"/>
+            </a:schemeClr>
+          </a:lnRef>
+          <a:fillRef idx="1">
+            <a:schemeClr val="accent1"/>
+          </a:fillRef>
+          <a:effectRef idx="0">
+            <a:schemeClr val="accent1"/>
+          </a:effectRef>
+          <a:fontRef idx="minor">
+            <a:schemeClr val="lt1"/>
+          </a:fontRef>
+        </p:style>
+        <p:txBody>
+          <a:bodyPr rtlCol="0" anchor="ctr"/>
+          <a:lstStyle/>
+          <a:p>
+            <a:pPr marL="0" marR="0" lvl="0" indent="0" algn="ctr" defTabSz="914400" rtl="0" eaLnBrk="1" fontAlgn="auto" latinLnBrk="0" hangingPunct="1">
+              <a:lnSpc>
+                <a:spcPct val="100000"/>
+              </a:lnSpc>
+              <a:spcBef>
+                <a:spcPts val="0"/>
+              </a:spcBef>
+              <a:spcAft>
+                <a:spcPts val="0"/>
+              </a:spcAft>
+              <a:buClrTx/>
+              <a:buSzTx/>
+              <a:buFontTx/>
+              <a:buNone/>
+              <a:tabLst/>
+              <a:defRPr/>
+            </a:pPr>
+            <a:endParaRPr kumimoji="0" lang="en-US" sz="1800" b="0" i="0" u="none" strike="noStrike" kern="1200" cap="none" spc="0" normalizeH="0" baseline="0" noProof="0">
+              <a:ln>
+                <a:noFill/>
+              </a:ln>
+              <a:solidFill>
+                <a:prstClr val="white"/>
+              </a:solidFill>
+              <a:effectLst/>
+              <a:uLnTx/>
+              <a:uFillTx/>
+              <a:latin typeface="Calibri" panose="020F0502020204030204"/>
+              <a:ea typeface="+mn-ea"/>
+              <a:cs typeface="+mn-cs"/>
+            </a:endParaRPr>
+          </a:p>
+        </p:txBody>
+      </p:sp>
+      <p:pic>
+        <p:nvPicPr>
+          <p:cNvPr id="11" name="Grafik 10" descr="Ein Bild, das Gras, draußen, Heu, Pflanze enthält.&#10;&#10;Automatisch generierte Beschreibung">
+            <a:extLst>
+              <a:ext uri="{FF2B5EF4-FFF2-40B4-BE49-F238E27FC236}">
+                <a16:creationId xmlns:a16="http://schemas.microsoft.com/office/drawing/2014/main" id="{6FCF2D30-7191-4A13-B2AF-AF8040C515C6}"/>
+              </a:ext>
+            </a:extLst>
+          </p:cNvPr>
+          <p:cNvPicPr>
+            <a:picLocks noChangeAspect="1"/>
+          </p:cNvPicPr>
+          <p:nvPr/>
+        </p:nvPicPr>
+        <p:blipFill rotWithShape="1">
+          <a:blip r:embed="rId2">
+            <a:extLst>
+              <a:ext uri="{28A0092B-C50C-407E-A947-70E740481C1C}">
+                <a14:useLocalDpi xmlns:a14="http://schemas.microsoft.com/office/drawing/2010/main" val="0"/>
+              </a:ext>
+            </a:extLst>
+          </a:blip>
+          <a:srcRect r="2398" b="-4"/>
+          <a:stretch/>
+        </p:blipFill>
+        <p:spPr>
+          <a:xfrm>
+            <a:off x="7689829" y="10"/>
+            <a:ext cx="4502173" cy="3448209"/>
+          </a:xfrm>
+          <a:custGeom>
+            <a:avLst/>
+            <a:gdLst/>
+            <a:ahLst/>
+            <a:cxnLst/>
+            <a:rect l="l" t="t" r="r" b="b"/>
+            <a:pathLst>
+              <a:path w="4502173" h="3448219">
+                <a:moveTo>
+                  <a:pt x="205627" y="0"/>
+                </a:moveTo>
+                <a:lnTo>
+                  <a:pt x="4502173" y="0"/>
+                </a:lnTo>
+                <a:lnTo>
+                  <a:pt x="4502173" y="2368934"/>
+                </a:lnTo>
+                <a:lnTo>
+                  <a:pt x="4365663" y="2551486"/>
+                </a:lnTo>
+                <a:cubicBezTo>
+                  <a:pt x="3913696" y="3099144"/>
+                  <a:pt x="3229704" y="3448219"/>
+                  <a:pt x="2464181" y="3448219"/>
+                </a:cubicBezTo>
+                <a:cubicBezTo>
+                  <a:pt x="1103251" y="3448219"/>
+                  <a:pt x="0" y="2344968"/>
+                  <a:pt x="0" y="984038"/>
+                </a:cubicBezTo>
+                <a:cubicBezTo>
+                  <a:pt x="0" y="643806"/>
+                  <a:pt x="68954" y="319678"/>
+                  <a:pt x="193648" y="24867"/>
+                </a:cubicBezTo>
+                <a:close/>
+              </a:path>
+            </a:pathLst>
+          </a:custGeom>
+        </p:spPr>
+      </p:pic>
+      <p:sp>
+        <p:nvSpPr>
+          <p:cNvPr id="25" name="Freeform: Shape 24">
+            <a:extLst>
+              <a:ext uri="{FF2B5EF4-FFF2-40B4-BE49-F238E27FC236}">
+                <a16:creationId xmlns:a16="http://schemas.microsoft.com/office/drawing/2014/main" id="{648F5915-2CE1-4F74-88C5-D4366893D2DF}"/>
+              </a:ext>
+              <a:ext uri="{C183D7F6-B498-43B3-948B-1728B52AA6E4}">
+                <adec:decorative xmlns:adec="http://schemas.microsoft.com/office/drawing/2017/decorative" val="1"/>
+              </a:ext>
+            </a:extLst>
+          </p:cNvPr>
+          <p:cNvSpPr>
+            <a:spLocks noGrp="1" noRot="1" noChangeAspect="1" noMove="1" noResize="1" noEditPoints="1" noAdjustHandles="1" noChangeArrowheads="1" noChangeShapeType="1" noTextEdit="1"/>
+          </p:cNvSpPr>
+          <p:nvPr>
+            <p:extLst>
+              <p:ext uri="{386F3935-93C4-4BCD-93E2-E3B085C9AB24}">
+                <p16:designElem xmlns:p16="http://schemas.microsoft.com/office/powerpoint/2015/main" val="1"/>
+              </p:ext>
+            </p:extLst>
+          </p:nvPr>
+        </p:nvSpPr>
+        <p:spPr>
+          <a:xfrm>
+            <a:off x="8604737" y="3918051"/>
+            <a:ext cx="3587263" cy="2939948"/>
+          </a:xfrm>
+          <a:custGeom>
+            <a:avLst/>
+            <a:gdLst>
+              <a:gd name="connsiteX0" fmla="*/ 2070613 w 3587263"/>
+              <a:gd name="connsiteY0" fmla="*/ 0 h 2939948"/>
+              <a:gd name="connsiteX1" fmla="*/ 3534758 w 3587263"/>
+              <a:gd name="connsiteY1" fmla="*/ 606469 h 2939948"/>
+              <a:gd name="connsiteX2" fmla="*/ 3587263 w 3587263"/>
+              <a:gd name="connsiteY2" fmla="*/ 664240 h 2939948"/>
+              <a:gd name="connsiteX3" fmla="*/ 3587263 w 3587263"/>
+              <a:gd name="connsiteY3" fmla="*/ 2939948 h 2939948"/>
+              <a:gd name="connsiteX4" fmla="*/ 193241 w 3587263"/>
+              <a:gd name="connsiteY4" fmla="*/ 2939948 h 2939948"/>
+              <a:gd name="connsiteX5" fmla="*/ 162719 w 3587263"/>
+              <a:gd name="connsiteY5" fmla="*/ 2876589 h 2939948"/>
+              <a:gd name="connsiteX6" fmla="*/ 0 w 3587263"/>
+              <a:gd name="connsiteY6" fmla="*/ 2070613 h 2939948"/>
+              <a:gd name="connsiteX7" fmla="*/ 2070613 w 3587263"/>
+              <a:gd name="connsiteY7" fmla="*/ 0 h 2939948"/>
+            </a:gdLst>
+            <a:ahLst/>
+            <a:cxnLst>
+              <a:cxn ang="0">
+                <a:pos x="connsiteX0" y="connsiteY0"/>
+              </a:cxn>
+              <a:cxn ang="0">
+                <a:pos x="connsiteX1" y="connsiteY1"/>
+              </a:cxn>
+              <a:cxn ang="0">
+                <a:pos x="connsiteX2" y="connsiteY2"/>
+              </a:cxn>
+              <a:cxn ang="0">
+                <a:pos x="connsiteX3" y="connsiteY3"/>
+              </a:cxn>
+              <a:cxn ang="0">
+                <a:pos x="connsiteX4" y="connsiteY4"/>
+              </a:cxn>
+              <a:cxn ang="0">
+                <a:pos x="connsiteX5" y="connsiteY5"/>
+              </a:cxn>
+              <a:cxn ang="0">
+                <a:pos x="connsiteX6" y="connsiteY6"/>
+              </a:cxn>
+              <a:cxn ang="0">
+                <a:pos x="connsiteX7" y="connsiteY7"/>
+              </a:cxn>
+            </a:cxnLst>
+            <a:rect l="l" t="t" r="r" b="b"/>
+            <a:pathLst>
+              <a:path w="3587263" h="2939948">
+                <a:moveTo>
+                  <a:pt x="2070613" y="0"/>
+                </a:moveTo>
+                <a:cubicBezTo>
+                  <a:pt x="2642397" y="0"/>
+                  <a:pt x="3160050" y="231761"/>
+                  <a:pt x="3534758" y="606469"/>
+                </a:cubicBezTo>
+                <a:lnTo>
+                  <a:pt x="3587263" y="664240"/>
+                </a:lnTo>
+                <a:lnTo>
+                  <a:pt x="3587263" y="2939948"/>
+                </a:lnTo>
+                <a:lnTo>
+                  <a:pt x="193241" y="2939948"/>
+                </a:lnTo>
+                <a:lnTo>
+                  <a:pt x="162719" y="2876589"/>
+                </a:lnTo>
+                <a:cubicBezTo>
+                  <a:pt x="57940" y="2628865"/>
+                  <a:pt x="0" y="2356505"/>
+                  <a:pt x="0" y="2070613"/>
+                </a:cubicBezTo>
+                <a:cubicBezTo>
+                  <a:pt x="0" y="927045"/>
+                  <a:pt x="927045" y="0"/>
+                  <a:pt x="2070613" y="0"/>
+                </a:cubicBezTo>
+                <a:close/>
+              </a:path>
+            </a:pathLst>
+          </a:custGeom>
+          <a:solidFill>
+            <a:srgbClr val="FFFFFF">
+              <a:alpha val="80000"/>
+            </a:srgbClr>
+          </a:solidFill>
+          <a:ln>
+            <a:noFill/>
+          </a:ln>
+        </p:spPr>
+        <p:style>
+          <a:lnRef idx="2">
+            <a:schemeClr val="accent1">
+              <a:shade val="50000"/>
+            </a:schemeClr>
+          </a:lnRef>
+          <a:fillRef idx="1">
+            <a:schemeClr val="accent1"/>
+          </a:fillRef>
+          <a:effectRef idx="0">
+            <a:schemeClr val="accent1"/>
+          </a:effectRef>
+          <a:fontRef idx="minor">
+            <a:schemeClr val="lt1"/>
+          </a:fontRef>
+        </p:style>
+        <p:txBody>
+          <a:bodyPr rtlCol="0" anchor="ctr"/>
+          <a:lstStyle/>
+          <a:p>
+            <a:pPr marL="0" marR="0" lvl="0" indent="0" algn="ctr" defTabSz="914400" rtl="0" eaLnBrk="1" fontAlgn="auto" latinLnBrk="0" hangingPunct="1">
+              <a:lnSpc>
+                <a:spcPct val="100000"/>
+              </a:lnSpc>
+              <a:spcBef>
+                <a:spcPts val="0"/>
+              </a:spcBef>
+              <a:spcAft>
+                <a:spcPts val="0"/>
+              </a:spcAft>
+              <a:buClrTx/>
+              <a:buSzTx/>
+              <a:buFontTx/>
+              <a:buNone/>
+              <a:tabLst/>
+              <a:defRPr/>
+            </a:pPr>
+            <a:endParaRPr kumimoji="0" lang="en-US" sz="1800" b="0" i="0" u="none" strike="noStrike" kern="1200" cap="none" spc="0" normalizeH="0" baseline="0" noProof="0">
+              <a:ln>
+                <a:noFill/>
+              </a:ln>
+              <a:solidFill>
+                <a:prstClr val="white"/>
+              </a:solidFill>
+              <a:effectLst/>
+              <a:uLnTx/>
+              <a:uFillTx/>
+              <a:latin typeface="Calibri" panose="020F0502020204030204"/>
+              <a:ea typeface="+mn-ea"/>
+              <a:cs typeface="+mn-cs"/>
+            </a:endParaRPr>
+          </a:p>
+        </p:txBody>
+      </p:sp>
+      <p:pic>
+        <p:nvPicPr>
+          <p:cNvPr id="7" name="Grafik 6" descr="Ein Bild, das Gras, draußen, Säugetier enthält.&#10;&#10;Automatisch generierte Beschreibung">
+            <a:extLst>
+              <a:ext uri="{FF2B5EF4-FFF2-40B4-BE49-F238E27FC236}">
+                <a16:creationId xmlns:a16="http://schemas.microsoft.com/office/drawing/2014/main" id="{300646DE-663C-4CFD-981E-EB35F462FDFF}"/>
+              </a:ext>
+            </a:extLst>
+          </p:cNvPr>
+          <p:cNvPicPr>
+            <a:picLocks noChangeAspect="1"/>
+          </p:cNvPicPr>
+          <p:nvPr/>
+        </p:nvPicPr>
+        <p:blipFill rotWithShape="1">
+          <a:blip r:embed="rId3">
+            <a:extLst>
+              <a:ext uri="{28A0092B-C50C-407E-A947-70E740481C1C}">
+                <a14:useLocalDpi xmlns:a14="http://schemas.microsoft.com/office/drawing/2010/main" val="0"/>
+              </a:ext>
+            </a:extLst>
+          </a:blip>
+          <a:srcRect t="25192" b="13736"/>
+          <a:stretch/>
+        </p:blipFill>
+        <p:spPr>
+          <a:xfrm>
+            <a:off x="8768827" y="4082141"/>
+            <a:ext cx="3423175" cy="2775859"/>
+          </a:xfrm>
+          <a:custGeom>
+            <a:avLst/>
+            <a:gdLst/>
+            <a:ahLst/>
+            <a:cxnLst/>
+            <a:rect l="l" t="t" r="r" b="b"/>
+            <a:pathLst>
+              <a:path w="3423175" h="2775859">
+                <a:moveTo>
+                  <a:pt x="1906524" y="0"/>
+                </a:moveTo>
+                <a:cubicBezTo>
+                  <a:pt x="2498805" y="0"/>
+                  <a:pt x="3028006" y="270078"/>
+                  <a:pt x="3377691" y="693798"/>
+                </a:cubicBezTo>
+                <a:lnTo>
+                  <a:pt x="3423175" y="754624"/>
+                </a:lnTo>
+                <a:lnTo>
+                  <a:pt x="3423175" y="2775859"/>
+                </a:lnTo>
+                <a:lnTo>
+                  <a:pt x="211114" y="2775859"/>
+                </a:lnTo>
+                <a:lnTo>
+                  <a:pt x="149824" y="2648629"/>
+                </a:lnTo>
+                <a:cubicBezTo>
+                  <a:pt x="53349" y="2420536"/>
+                  <a:pt x="0" y="2169760"/>
+                  <a:pt x="0" y="1906524"/>
+                </a:cubicBezTo>
+                <a:cubicBezTo>
+                  <a:pt x="0" y="853580"/>
+                  <a:pt x="853580" y="0"/>
+                  <a:pt x="1906524" y="0"/>
+                </a:cubicBezTo>
+                <a:close/>
+              </a:path>
+            </a:pathLst>
+          </a:custGeom>
+        </p:spPr>
+      </p:pic>
+      <p:sp>
+        <p:nvSpPr>
+          <p:cNvPr id="13" name="Textfeld 12">
+            <a:extLst>
+              <a:ext uri="{FF2B5EF4-FFF2-40B4-BE49-F238E27FC236}">
+                <a16:creationId xmlns:a16="http://schemas.microsoft.com/office/drawing/2014/main" id="{2FCE15F2-1B92-469D-AA7B-4CB6FF9A281F}"/>
+              </a:ext>
+            </a:extLst>
+          </p:cNvPr>
+          <p:cNvSpPr txBox="1"/>
+          <p:nvPr/>
+        </p:nvSpPr>
+        <p:spPr>
+          <a:xfrm>
+            <a:off x="47048" y="6481038"/>
+            <a:ext cx="7642781" cy="246221"/>
+          </a:xfrm>
+          <a:prstGeom prst="rect">
+            <a:avLst/>
+          </a:prstGeom>
+          <a:noFill/>
+        </p:spPr>
+        <p:txBody>
+          <a:bodyPr wrap="square">
+            <a:spAutoFit/>
+          </a:bodyPr>
+          <a:lstStyle/>
+          <a:p>
+            <a:pPr marL="0" indent="0">
+              <a:buNone/>
+            </a:pPr>
+            <a:r>
+              <a:rPr lang="de-CH" sz="1000" dirty="0"/>
+              <a:t>Sources: http://www.suwanneeriverranch.com/photos/HogsWaterTwo.jpg, </a:t>
+            </a:r>
+            <a:r>
+              <a:rPr lang="en-GB" sz="1000" dirty="0"/>
+              <a:t>http://aws.fuzzytravel.com/nimfi/pictures/66555.jpg</a:t>
+            </a:r>
+          </a:p>
+        </p:txBody>
+      </p:sp>
+    </p:spTree>
+    <p:extLst>
+      <p:ext uri="{BB962C8B-B14F-4D97-AF65-F5344CB8AC3E}">
+        <p14:creationId xmlns:p14="http://schemas.microsoft.com/office/powerpoint/2010/main" val="895728551"/>
+      </p:ext>
+    </p:extLst>
+  </p:cSld>
+  <p:clrMapOvr>
+    <a:overrideClrMapping bg1="dk1" tx1="lt1" bg2="dk2" tx2="lt2" accent1="accent1" accent2="accent2" accent3="accent3" accent4="accent4" accent5="accent5" accent6="accent6" hlink="hlink" folHlink="folHlink"/>
+  </p:clrMapOvr>
+</p:sld>
+</file>
+
+<file path=ppt/slides/slide3.xml><?xml version="1.0" encoding="utf-8"?>
+<p:sld xmlns:a="http://schemas.openxmlformats.org/drawingml/2006/main" xmlns:r="http://schemas.openxmlformats.org/officeDocument/2006/relationships" xmlns:p="http://schemas.openxmlformats.org/presentationml/2006/main">
+  <p:cSld>
+    <p:bg>
+      <p:bgPr>
+        <a:solidFill>
+          <a:schemeClr val="bg1">
+            <a:tint val="95000"/>
+            <a:satMod val="170000"/>
+          </a:schemeClr>
+        </a:solidFill>
+        <a:effectLst/>
+      </p:bgPr>
+    </p:bg>
+    <p:spTree>
+      <p:nvGrpSpPr>
+        <p:cNvPr id="1" name=""/>
+        <p:cNvGrpSpPr/>
+        <p:nvPr/>
+      </p:nvGrpSpPr>
+      <p:grpSpPr>
+        <a:xfrm>
+          <a:off x="0" y="0"/>
+          <a:ext cx="0" cy="0"/>
+          <a:chOff x="0" y="0"/>
+          <a:chExt cx="0" cy="0"/>
+        </a:xfrm>
+      </p:grpSpPr>
+      <p:sp>
+        <p:nvSpPr>
+          <p:cNvPr id="2" name="Titel 1">
+            <a:extLst>
+              <a:ext uri="{FF2B5EF4-FFF2-40B4-BE49-F238E27FC236}">
+                <a16:creationId xmlns:a16="http://schemas.microsoft.com/office/drawing/2014/main" id="{EA022BEC-5F5D-47AF-8A2D-4720FC478896}"/>
+              </a:ext>
+            </a:extLst>
+          </p:cNvPr>
+          <p:cNvSpPr>
+            <a:spLocks noGrp="1"/>
+          </p:cNvSpPr>
+          <p:nvPr>
+            <p:ph type="title"/>
+          </p:nvPr>
+        </p:nvSpPr>
+        <p:spPr>
+          <a:xfrm>
+            <a:off x="6289158" y="803325"/>
+            <a:ext cx="5259707" cy="1325563"/>
+          </a:xfrm>
+        </p:spPr>
+        <p:txBody>
+          <a:bodyPr>
+            <a:normAutofit/>
+          </a:bodyPr>
+          <a:lstStyle/>
+          <a:p>
+            <a:r>
+              <a:rPr lang="de-DE"/>
+              <a:t>Research questions</a:t>
+            </a:r>
+            <a:endParaRPr lang="de-CH" dirty="0"/>
+          </a:p>
+        </p:txBody>
+      </p:sp>
+      <p:sp>
+        <p:nvSpPr>
+          <p:cNvPr id="9" name="Freeform: Shape 8">
+            <a:extLst>
+              <a:ext uri="{FF2B5EF4-FFF2-40B4-BE49-F238E27FC236}">
+                <a16:creationId xmlns:a16="http://schemas.microsoft.com/office/drawing/2014/main" id="{357DD0D3-F869-46D0-944C-6EC60E19E351}"/>
+              </a:ext>
+              <a:ext uri="{C183D7F6-B498-43B3-948B-1728B52AA6E4}">
+                <adec:decorative xmlns:adec="http://schemas.microsoft.com/office/drawing/2017/decorative" val="1"/>
+              </a:ext>
+            </a:extLst>
+          </p:cNvPr>
+          <p:cNvSpPr>
+            <a:spLocks noGrp="1" noRot="1" noChangeAspect="1" noMove="1" noResize="1" noEditPoints="1" noAdjustHandles="1" noChangeArrowheads="1" noChangeShapeType="1" noTextEdit="1"/>
+          </p:cNvSpPr>
+          <p:nvPr>
+            <p:extLst>
+              <p:ext uri="{386F3935-93C4-4BCD-93E2-E3B085C9AB24}">
+                <p16:designElem xmlns:p16="http://schemas.microsoft.com/office/powerpoint/2015/main" val="1"/>
+              </p:ext>
+            </p:extLst>
+          </p:nvPr>
+        </p:nvSpPr>
+        <p:spPr>
+          <a:xfrm>
+            <a:off x="0" y="0"/>
+            <a:ext cx="6136816" cy="5254922"/>
+          </a:xfrm>
+          <a:custGeom>
+            <a:avLst/>
+            <a:gdLst>
+              <a:gd name="connsiteX0" fmla="*/ 0 w 6136816"/>
+              <a:gd name="connsiteY0" fmla="*/ 0 h 5254922"/>
+              <a:gd name="connsiteX1" fmla="*/ 6136816 w 6136816"/>
+              <a:gd name="connsiteY1" fmla="*/ 0 h 5254922"/>
+              <a:gd name="connsiteX2" fmla="*/ 6134892 w 6136816"/>
+              <a:gd name="connsiteY2" fmla="*/ 111520 h 5254922"/>
+              <a:gd name="connsiteX3" fmla="*/ 6066513 w 6136816"/>
+              <a:gd name="connsiteY3" fmla="*/ 752995 h 5254922"/>
+              <a:gd name="connsiteX4" fmla="*/ 140712 w 6136816"/>
+              <a:gd name="connsiteY4" fmla="*/ 5219363 h 5254922"/>
+              <a:gd name="connsiteX5" fmla="*/ 0 w 6136816"/>
+              <a:gd name="connsiteY5" fmla="*/ 5199534 h 5254922"/>
+            </a:gdLst>
+            <a:ahLst/>
+            <a:cxnLst>
+              <a:cxn ang="0">
+                <a:pos x="connsiteX0" y="connsiteY0"/>
+              </a:cxn>
+              <a:cxn ang="0">
+                <a:pos x="connsiteX1" y="connsiteY1"/>
+              </a:cxn>
+              <a:cxn ang="0">
+                <a:pos x="connsiteX2" y="connsiteY2"/>
+              </a:cxn>
+              <a:cxn ang="0">
+                <a:pos x="connsiteX3" y="connsiteY3"/>
+              </a:cxn>
+              <a:cxn ang="0">
+                <a:pos x="connsiteX4" y="connsiteY4"/>
+              </a:cxn>
+              <a:cxn ang="0">
+                <a:pos x="connsiteX5" y="connsiteY5"/>
+              </a:cxn>
+            </a:cxnLst>
+            <a:rect l="l" t="t" r="r" b="b"/>
+            <a:pathLst>
+              <a:path w="6136816" h="5254922">
+                <a:moveTo>
+                  <a:pt x="0" y="0"/>
+                </a:moveTo>
+                <a:lnTo>
+                  <a:pt x="6136816" y="0"/>
+                </a:lnTo>
+                <a:lnTo>
+                  <a:pt x="6134892" y="111520"/>
+                </a:lnTo>
+                <a:cubicBezTo>
+                  <a:pt x="6124961" y="323936"/>
+                  <a:pt x="6102367" y="538040"/>
+                  <a:pt x="6066513" y="752995"/>
+                </a:cubicBezTo>
+                <a:cubicBezTo>
+                  <a:pt x="5592281" y="3596146"/>
+                  <a:pt x="2972232" y="5545369"/>
+                  <a:pt x="140712" y="5219363"/>
+                </a:cubicBezTo>
+                <a:lnTo>
+                  <a:pt x="0" y="5199534"/>
+                </a:lnTo>
+                <a:close/>
+              </a:path>
+            </a:pathLst>
+          </a:custGeom>
+          <a:solidFill>
+            <a:schemeClr val="tx1">
+              <a:alpha val="80000"/>
+            </a:schemeClr>
+          </a:solidFill>
+          <a:ln>
+            <a:noFill/>
+          </a:ln>
+        </p:spPr>
+        <p:style>
+          <a:lnRef idx="2">
+            <a:schemeClr val="accent1">
+              <a:shade val="50000"/>
+            </a:schemeClr>
+          </a:lnRef>
+          <a:fillRef idx="1">
+            <a:schemeClr val="accent1"/>
+          </a:fillRef>
+          <a:effectRef idx="0">
+            <a:schemeClr val="accent1"/>
+          </a:effectRef>
+          <a:fontRef idx="minor">
+            <a:schemeClr val="lt1"/>
+          </a:fontRef>
+        </p:style>
+        <p:txBody>
+          <a:bodyPr wrap="square" rtlCol="0" anchor="ctr">
+            <a:noAutofit/>
+          </a:bodyPr>
+          <a:lstStyle/>
+          <a:p>
+            <a:pPr algn="ctr"/>
+            <a:endParaRPr lang="en-US" dirty="0"/>
+          </a:p>
+        </p:txBody>
+      </p:sp>
+      <p:pic>
+        <p:nvPicPr>
+          <p:cNvPr id="4" name="Grafik 3">
+            <a:extLst>
+              <a:ext uri="{FF2B5EF4-FFF2-40B4-BE49-F238E27FC236}">
+                <a16:creationId xmlns:a16="http://schemas.microsoft.com/office/drawing/2014/main" id="{D0823300-16B2-40DC-AC1D-E7B7EC9CFD27}"/>
+              </a:ext>
+            </a:extLst>
+          </p:cNvPr>
+          <p:cNvPicPr>
+            <a:picLocks noChangeAspect="1"/>
+          </p:cNvPicPr>
+          <p:nvPr/>
+        </p:nvPicPr>
+        <p:blipFill>
+          <a:blip r:embed="rId2">
+            <a:extLst>
+              <a:ext uri="{28A0092B-C50C-407E-A947-70E740481C1C}">
+                <a14:useLocalDpi xmlns:a14="http://schemas.microsoft.com/office/drawing/2010/main" val="0"/>
+              </a:ext>
+            </a:extLst>
+          </a:blip>
+          <a:srcRect l="9477" r="9477"/>
+          <a:stretch/>
+        </p:blipFill>
+        <p:spPr>
+          <a:xfrm>
+            <a:off x="1" y="2"/>
+            <a:ext cx="5863721" cy="4984915"/>
+          </a:xfrm>
+          <a:custGeom>
+            <a:avLst/>
+            <a:gdLst/>
+            <a:ahLst/>
+            <a:cxnLst/>
+            <a:rect l="l" t="t" r="r" b="b"/>
+            <a:pathLst>
+              <a:path w="5863721" h="4984915">
+                <a:moveTo>
+                  <a:pt x="0" y="0"/>
+                </a:moveTo>
+                <a:lnTo>
+                  <a:pt x="5863721" y="0"/>
+                </a:lnTo>
+                <a:lnTo>
+                  <a:pt x="5844576" y="326138"/>
+                </a:lnTo>
+                <a:cubicBezTo>
+                  <a:pt x="5833049" y="448313"/>
+                  <a:pt x="5817094" y="570952"/>
+                  <a:pt x="5796589" y="693884"/>
+                </a:cubicBezTo>
+                <a:cubicBezTo>
+                  <a:pt x="5344573" y="3403845"/>
+                  <a:pt x="2847261" y="5261756"/>
+                  <a:pt x="148386" y="4951022"/>
+                </a:cubicBezTo>
+                <a:lnTo>
+                  <a:pt x="0" y="4930112"/>
+                </a:lnTo>
+                <a:close/>
+              </a:path>
+            </a:pathLst>
+          </a:custGeom>
+        </p:spPr>
+      </p:pic>
+      <p:sp>
+        <p:nvSpPr>
+          <p:cNvPr id="3" name="Inhaltsplatzhalter 2">
+            <a:extLst>
+              <a:ext uri="{FF2B5EF4-FFF2-40B4-BE49-F238E27FC236}">
+                <a16:creationId xmlns:a16="http://schemas.microsoft.com/office/drawing/2014/main" id="{B7CE67D2-1EF9-4A52-8755-43D2F9955D83}"/>
+              </a:ext>
+            </a:extLst>
+          </p:cNvPr>
+          <p:cNvSpPr>
+            <a:spLocks noGrp="1"/>
+          </p:cNvSpPr>
+          <p:nvPr>
+            <p:ph idx="1"/>
+          </p:nvPr>
+        </p:nvSpPr>
+        <p:spPr>
+          <a:xfrm>
+            <a:off x="6289158" y="2279018"/>
+            <a:ext cx="5259714" cy="3375920"/>
+          </a:xfrm>
+        </p:spPr>
+        <p:txBody>
+          <a:bodyPr anchor="t">
+            <a:normAutofit/>
+          </a:bodyPr>
+          <a:lstStyle/>
+          <a:p>
+            <a:r>
+              <a:rPr lang="en-GB" sz="1800" dirty="0"/>
+              <a:t>How can resting sites be modelled based on spatiotemporal movement data?</a:t>
+            </a:r>
+          </a:p>
+          <a:p>
+            <a:r>
+              <a:rPr lang="en-GB" sz="1800" dirty="0"/>
+              <a:t>Can locations frequently visited by wild boar be determined efficiently and effectively in the provided research data?</a:t>
+            </a:r>
+          </a:p>
+          <a:p>
+            <a:r>
+              <a:rPr lang="en-GB" sz="1800" dirty="0"/>
+              <a:t>Can these regular resting places be clearly defined as kettles or wallows?</a:t>
+            </a:r>
+          </a:p>
+          <a:p>
+            <a:endParaRPr lang="en-GB" sz="1800" dirty="0"/>
+          </a:p>
+          <a:p>
+            <a:pPr marL="0" indent="0">
+              <a:buNone/>
+            </a:pPr>
+            <a:r>
+              <a:rPr lang="en-GB" sz="1800" b="1" dirty="0">
+                <a:sym typeface="Wingdings" panose="05000000000000000000" pitchFamily="2" charset="2"/>
+              </a:rPr>
+              <a:t> </a:t>
+            </a:r>
+            <a:r>
+              <a:rPr lang="en-GB" sz="1800" b="1" dirty="0"/>
+              <a:t>Best possible outcome: </a:t>
+            </a:r>
+            <a:r>
+              <a:rPr lang="en-GB" sz="1800" dirty="0"/>
+              <a:t>distinction between nests and wallows</a:t>
+            </a:r>
+          </a:p>
+        </p:txBody>
+      </p:sp>
+    </p:spTree>
+    <p:extLst>
+      <p:ext uri="{BB962C8B-B14F-4D97-AF65-F5344CB8AC3E}">
+        <p14:creationId xmlns:p14="http://schemas.microsoft.com/office/powerpoint/2010/main" val="1444707244"/>
+      </p:ext>
+    </p:extLst>
+  </p:cSld>
+  <p:clrMapOvr>
+    <a:overrideClrMapping bg1="dk1" tx1="lt1" bg2="dk2" tx2="lt2" accent1="accent1" accent2="accent2" accent3="accent3" accent4="accent4" accent5="accent5" accent6="accent6" hlink="hlink" folHlink="folHlink"/>
+  </p:clrMapOvr>
+</p:sld>
+</file>
+
+<file path=ppt/slides/slide4.xml><?xml version="1.0" encoding="utf-8"?>
+<p:sld xmlns:a="http://schemas.openxmlformats.org/drawingml/2006/main" xmlns:r="http://schemas.openxmlformats.org/officeDocument/2006/relationships" xmlns:p="http://schemas.openxmlformats.org/presentationml/2006/main">
+  <p:cSld>
+    <p:bg>
+      <p:bgPr>
+        <a:solidFill>
+          <a:schemeClr val="bg1">
+            <a:tint val="95000"/>
+            <a:satMod val="170000"/>
+          </a:schemeClr>
+        </a:solidFill>
+        <a:effectLst/>
+      </p:bgPr>
+    </p:bg>
+    <p:spTree>
+      <p:nvGrpSpPr>
+        <p:cNvPr id="1" name=""/>
+        <p:cNvGrpSpPr/>
+        <p:nvPr/>
+      </p:nvGrpSpPr>
+      <p:grpSpPr>
+        <a:xfrm>
+          <a:off x="0" y="0"/>
+          <a:ext cx="0" cy="0"/>
+          <a:chOff x="0" y="0"/>
+          <a:chExt cx="0" cy="0"/>
+        </a:xfrm>
+      </p:grpSpPr>
+      <p:sp>
+        <p:nvSpPr>
+          <p:cNvPr id="2" name="Titel 1">
+            <a:extLst>
+              <a:ext uri="{FF2B5EF4-FFF2-40B4-BE49-F238E27FC236}">
+                <a16:creationId xmlns:a16="http://schemas.microsoft.com/office/drawing/2014/main" id="{001B5CE5-958C-4D36-BE3C-932591C7F947}"/>
+              </a:ext>
+            </a:extLst>
+          </p:cNvPr>
+          <p:cNvSpPr>
+            <a:spLocks noGrp="1"/>
+          </p:cNvSpPr>
+          <p:nvPr>
+            <p:ph type="title"/>
+          </p:nvPr>
+        </p:nvSpPr>
+        <p:spPr>
+          <a:xfrm>
+            <a:off x="6234330" y="803325"/>
+            <a:ext cx="5314536" cy="1325563"/>
+          </a:xfrm>
+        </p:spPr>
+        <p:txBody>
+          <a:bodyPr>
+            <a:normAutofit/>
+          </a:bodyPr>
+          <a:lstStyle/>
+          <a:p>
+            <a:r>
+              <a:rPr lang="de-CH" dirty="0"/>
+              <a:t>Research plan</a:t>
+            </a:r>
+          </a:p>
+        </p:txBody>
+      </p:sp>
+      <p:sp>
+        <p:nvSpPr>
+          <p:cNvPr id="9" name="Freeform: Shape 8">
+            <a:extLst>
+              <a:ext uri="{FF2B5EF4-FFF2-40B4-BE49-F238E27FC236}">
+                <a16:creationId xmlns:a16="http://schemas.microsoft.com/office/drawing/2014/main" id="{CF62D2A7-8207-488C-9F46-316BA81A16C8}"/>
+              </a:ext>
+              <a:ext uri="{C183D7F6-B498-43B3-948B-1728B52AA6E4}">
+                <adec:decorative xmlns:adec="http://schemas.microsoft.com/office/drawing/2017/decorative" val="1"/>
+              </a:ext>
+            </a:extLst>
+          </p:cNvPr>
+          <p:cNvSpPr>
+            <a:spLocks noGrp="1" noRot="1" noChangeAspect="1" noMove="1" noResize="1" noEditPoints="1" noAdjustHandles="1" noChangeArrowheads="1" noChangeShapeType="1" noTextEdit="1"/>
+          </p:cNvSpPr>
+          <p:nvPr>
+            <p:extLst>
+              <p:ext uri="{386F3935-93C4-4BCD-93E2-E3B085C9AB24}">
+                <p16:designElem xmlns:p16="http://schemas.microsoft.com/office/powerpoint/2015/main" val="1"/>
+              </p:ext>
+            </p:extLst>
+          </p:nvPr>
+        </p:nvSpPr>
+        <p:spPr>
+          <a:xfrm>
+            <a:off x="0" y="-2008"/>
+            <a:ext cx="5609220" cy="5840278"/>
+          </a:xfrm>
+          <a:custGeom>
+            <a:avLst/>
+            <a:gdLst>
+              <a:gd name="connsiteX0" fmla="*/ 0 w 5609220"/>
+              <a:gd name="connsiteY0" fmla="*/ 0 h 5840278"/>
+              <a:gd name="connsiteX1" fmla="*/ 4637091 w 5609220"/>
+              <a:gd name="connsiteY1" fmla="*/ 0 h 5840278"/>
+              <a:gd name="connsiteX2" fmla="*/ 4822569 w 5609220"/>
+              <a:gd name="connsiteY2" fmla="*/ 204077 h 5840278"/>
+              <a:gd name="connsiteX3" fmla="*/ 5609220 w 5609220"/>
+              <a:gd name="connsiteY3" fmla="*/ 2395363 h 5840278"/>
+              <a:gd name="connsiteX4" fmla="*/ 2164305 w 5609220"/>
+              <a:gd name="connsiteY4" fmla="*/ 5840278 h 5840278"/>
+              <a:gd name="connsiteX5" fmla="*/ 238220 w 5609220"/>
+              <a:gd name="connsiteY5" fmla="*/ 5251941 h 5840278"/>
+              <a:gd name="connsiteX6" fmla="*/ 0 w 5609220"/>
+              <a:gd name="connsiteY6" fmla="*/ 5073803 h 5840278"/>
+            </a:gdLst>
+            <a:ahLst/>
+            <a:cxnLst>
+              <a:cxn ang="0">
+                <a:pos x="connsiteX0" y="connsiteY0"/>
+              </a:cxn>
+              <a:cxn ang="0">
+                <a:pos x="connsiteX1" y="connsiteY1"/>
+              </a:cxn>
+              <a:cxn ang="0">
+                <a:pos x="connsiteX2" y="connsiteY2"/>
+              </a:cxn>
+              <a:cxn ang="0">
+                <a:pos x="connsiteX3" y="connsiteY3"/>
+              </a:cxn>
+              <a:cxn ang="0">
+                <a:pos x="connsiteX4" y="connsiteY4"/>
+              </a:cxn>
+              <a:cxn ang="0">
+                <a:pos x="connsiteX5" y="connsiteY5"/>
+              </a:cxn>
+              <a:cxn ang="0">
+                <a:pos x="connsiteX6" y="connsiteY6"/>
+              </a:cxn>
+            </a:cxnLst>
+            <a:rect l="l" t="t" r="r" b="b"/>
+            <a:pathLst>
+              <a:path w="5609220" h="5840278">
+                <a:moveTo>
+                  <a:pt x="0" y="0"/>
+                </a:moveTo>
+                <a:lnTo>
+                  <a:pt x="4637091" y="0"/>
+                </a:lnTo>
+                <a:lnTo>
+                  <a:pt x="4822569" y="204077"/>
+                </a:lnTo>
+                <a:cubicBezTo>
+                  <a:pt x="5314007" y="799562"/>
+                  <a:pt x="5609220" y="1562987"/>
+                  <a:pt x="5609220" y="2395363"/>
+                </a:cubicBezTo>
+                <a:cubicBezTo>
+                  <a:pt x="5609220" y="4297937"/>
+                  <a:pt x="4066879" y="5840278"/>
+                  <a:pt x="2164305" y="5840278"/>
+                </a:cubicBezTo>
+                <a:cubicBezTo>
+                  <a:pt x="1450840" y="5840278"/>
+                  <a:pt x="788032" y="5623387"/>
+                  <a:pt x="238220" y="5251941"/>
+                </a:cubicBezTo>
+                <a:lnTo>
+                  <a:pt x="0" y="5073803"/>
+                </a:lnTo>
+                <a:close/>
+              </a:path>
+            </a:pathLst>
+          </a:custGeom>
+          <a:solidFill>
+            <a:srgbClr val="FFFFFF">
+              <a:alpha val="80000"/>
+            </a:srgbClr>
+          </a:solidFill>
+          <a:ln>
+            <a:noFill/>
+          </a:ln>
+        </p:spPr>
+        <p:style>
+          <a:lnRef idx="2">
+            <a:schemeClr val="accent1">
+              <a:shade val="50000"/>
+            </a:schemeClr>
+          </a:lnRef>
+          <a:fillRef idx="1">
+            <a:schemeClr val="accent1"/>
+          </a:fillRef>
+          <a:effectRef idx="0">
+            <a:schemeClr val="accent1"/>
+          </a:effectRef>
+          <a:fontRef idx="minor">
+            <a:schemeClr val="lt1"/>
+          </a:fontRef>
+        </p:style>
+        <p:txBody>
+          <a:bodyPr rtlCol="0" anchor="ctr"/>
+          <a:lstStyle/>
+          <a:p>
+            <a:pPr marL="0" marR="0" lvl="0" indent="0" algn="ctr" defTabSz="914400" rtl="0" eaLnBrk="1" fontAlgn="auto" latinLnBrk="0" hangingPunct="1">
+              <a:lnSpc>
+                <a:spcPct val="100000"/>
+              </a:lnSpc>
+              <a:spcBef>
+                <a:spcPts val="0"/>
+              </a:spcBef>
+              <a:spcAft>
+                <a:spcPts val="0"/>
+              </a:spcAft>
+              <a:buClrTx/>
+              <a:buSzTx/>
+              <a:buFontTx/>
+              <a:buNone/>
+              <a:tabLst/>
+              <a:defRPr/>
+            </a:pPr>
+            <a:endParaRPr kumimoji="0" lang="en-US" sz="1800" b="0" i="0" u="none" strike="noStrike" kern="1200" cap="none" spc="0" normalizeH="0" baseline="0" noProof="0">
+              <a:ln>
+                <a:noFill/>
+              </a:ln>
+              <a:solidFill>
+                <a:prstClr val="white"/>
+              </a:solidFill>
+              <a:effectLst/>
+              <a:uLnTx/>
+              <a:uFillTx/>
+              <a:latin typeface="Calibri" panose="020F0502020204030204"/>
+              <a:ea typeface="+mn-ea"/>
+              <a:cs typeface="+mn-cs"/>
+            </a:endParaRPr>
+          </a:p>
+        </p:txBody>
+      </p:sp>
+      <p:pic>
+        <p:nvPicPr>
+          <p:cNvPr id="4" name="Grafik 3">
+            <a:extLst>
+              <a:ext uri="{FF2B5EF4-FFF2-40B4-BE49-F238E27FC236}">
+                <a16:creationId xmlns:a16="http://schemas.microsoft.com/office/drawing/2014/main" id="{B825669A-0520-45A8-ADA3-F6BF1264945F}"/>
+              </a:ext>
+            </a:extLst>
+          </p:cNvPr>
+          <p:cNvPicPr>
+            <a:picLocks noChangeAspect="1"/>
+          </p:cNvPicPr>
+          <p:nvPr/>
+        </p:nvPicPr>
+        <p:blipFill rotWithShape="1">
+          <a:blip r:embed="rId2"/>
+          <a:srcRect l="11818" r="19137" b="2"/>
+          <a:stretch/>
+        </p:blipFill>
+        <p:spPr>
+          <a:xfrm>
+            <a:off x="2" y="-2"/>
+            <a:ext cx="5441859" cy="5654940"/>
+          </a:xfrm>
+          <a:custGeom>
+            <a:avLst/>
+            <a:gdLst/>
+            <a:ahLst/>
+            <a:cxnLst/>
+            <a:rect l="l" t="t" r="r" b="b"/>
+            <a:pathLst>
+              <a:path w="5441859" h="5654940">
+                <a:moveTo>
+                  <a:pt x="0" y="0"/>
+                </a:moveTo>
+                <a:lnTo>
+                  <a:pt x="4400491" y="0"/>
+                </a:lnTo>
+                <a:lnTo>
+                  <a:pt x="4484766" y="76595"/>
+                </a:lnTo>
+                <a:cubicBezTo>
+                  <a:pt x="5076107" y="667936"/>
+                  <a:pt x="5441859" y="1484866"/>
+                  <a:pt x="5441859" y="2387221"/>
+                </a:cubicBezTo>
+                <a:cubicBezTo>
+                  <a:pt x="5441859" y="4191932"/>
+                  <a:pt x="3978851" y="5654940"/>
+                  <a:pt x="2174140" y="5654940"/>
+                </a:cubicBezTo>
+                <a:cubicBezTo>
+                  <a:pt x="1412778" y="5654940"/>
+                  <a:pt x="712231" y="5394557"/>
+                  <a:pt x="156693" y="4957981"/>
+                </a:cubicBezTo>
+                <a:lnTo>
+                  <a:pt x="0" y="4820612"/>
+                </a:lnTo>
+                <a:close/>
+              </a:path>
+            </a:pathLst>
+          </a:custGeom>
+        </p:spPr>
+      </p:pic>
+      <p:sp>
+        <p:nvSpPr>
+          <p:cNvPr id="3" name="Inhaltsplatzhalter 2">
+            <a:extLst>
+              <a:ext uri="{FF2B5EF4-FFF2-40B4-BE49-F238E27FC236}">
+                <a16:creationId xmlns:a16="http://schemas.microsoft.com/office/drawing/2014/main" id="{D536A0EC-C227-468B-8F2F-698DB635DD5D}"/>
+              </a:ext>
+            </a:extLst>
+          </p:cNvPr>
+          <p:cNvSpPr>
+            <a:spLocks noGrp="1"/>
+          </p:cNvSpPr>
+          <p:nvPr>
+            <p:ph idx="1"/>
+          </p:nvPr>
+        </p:nvSpPr>
+        <p:spPr>
+          <a:xfrm>
+            <a:off x="6234329" y="2279017"/>
+            <a:ext cx="5609220" cy="3688149"/>
+          </a:xfrm>
+        </p:spPr>
+        <p:txBody>
+          <a:bodyPr anchor="t">
+            <a:normAutofit lnSpcReduction="10000"/>
+          </a:bodyPr>
+          <a:lstStyle/>
+          <a:p>
+            <a:r>
+              <a:rPr lang="de-DE" sz="1800" dirty="0"/>
+              <a:t>Segmentation </a:t>
+            </a:r>
+            <a:r>
+              <a:rPr lang="de-DE" sz="1800" dirty="0" err="1"/>
+              <a:t>of</a:t>
+            </a:r>
+            <a:r>
+              <a:rPr lang="de-DE" sz="1800" dirty="0"/>
+              <a:t> </a:t>
+            </a:r>
+            <a:r>
+              <a:rPr lang="de-DE" sz="1800" dirty="0" err="1"/>
+              <a:t>movement</a:t>
+            </a:r>
+            <a:r>
+              <a:rPr lang="de-DE" sz="1800" dirty="0"/>
+              <a:t> </a:t>
+            </a:r>
+            <a:r>
+              <a:rPr lang="de-DE" sz="1800" dirty="0" err="1"/>
+              <a:t>data</a:t>
+            </a:r>
+            <a:r>
+              <a:rPr lang="de-DE" sz="1800" dirty="0"/>
+              <a:t> </a:t>
+            </a:r>
+            <a:br>
+              <a:rPr lang="de-DE" sz="1800" dirty="0"/>
+            </a:br>
+            <a:r>
+              <a:rPr lang="de-DE" sz="1800" dirty="0"/>
+              <a:t>(</a:t>
+            </a:r>
+            <a:r>
+              <a:rPr lang="de-DE" sz="1800" dirty="0" err="1"/>
+              <a:t>criteria</a:t>
+            </a:r>
+            <a:r>
+              <a:rPr lang="de-DE" sz="1800" dirty="0"/>
+              <a:t> like </a:t>
+            </a:r>
+            <a:r>
+              <a:rPr lang="de-DE" sz="1800" dirty="0" err="1"/>
+              <a:t>speed</a:t>
+            </a:r>
+            <a:r>
+              <a:rPr lang="de-DE" sz="1800" dirty="0"/>
+              <a:t>, </a:t>
+            </a:r>
+            <a:r>
+              <a:rPr lang="de-DE" sz="1800" dirty="0" err="1"/>
+              <a:t>step</a:t>
+            </a:r>
+            <a:r>
+              <a:rPr lang="de-DE" sz="1800" dirty="0"/>
+              <a:t> </a:t>
+            </a:r>
+            <a:r>
+              <a:rPr lang="de-DE" sz="1800" dirty="0" err="1"/>
+              <a:t>length</a:t>
+            </a:r>
+            <a:r>
+              <a:rPr lang="de-DE" sz="1800" dirty="0"/>
+              <a:t>)</a:t>
+            </a:r>
+          </a:p>
+          <a:p>
+            <a:r>
+              <a:rPr lang="de-DE" sz="1800" dirty="0"/>
+              <a:t>Annotation </a:t>
+            </a:r>
+            <a:r>
+              <a:rPr lang="de-DE" sz="1800" dirty="0" err="1"/>
+              <a:t>of</a:t>
+            </a:r>
+            <a:r>
+              <a:rPr lang="de-DE" sz="1800" dirty="0"/>
+              <a:t> </a:t>
+            </a:r>
+            <a:r>
+              <a:rPr lang="de-DE" sz="1800" dirty="0" err="1"/>
+              <a:t>status</a:t>
+            </a:r>
+            <a:r>
+              <a:rPr lang="de-DE" sz="1800" dirty="0"/>
+              <a:t>:</a:t>
+            </a:r>
+          </a:p>
+          <a:p>
+            <a:pPr lvl="1"/>
+            <a:r>
+              <a:rPr lang="de-DE" sz="1800" dirty="0" err="1"/>
+              <a:t>Resting</a:t>
+            </a:r>
+            <a:endParaRPr lang="de-DE" sz="1800" dirty="0"/>
+          </a:p>
+          <a:p>
+            <a:pPr lvl="1"/>
+            <a:r>
+              <a:rPr lang="de-DE" sz="1800" dirty="0"/>
+              <a:t>Moving</a:t>
+            </a:r>
+          </a:p>
+          <a:p>
+            <a:pPr lvl="1"/>
+            <a:r>
+              <a:rPr lang="de-DE" sz="1800" dirty="0" err="1"/>
+              <a:t>Feeding</a:t>
+            </a:r>
+            <a:endParaRPr lang="de-DE" sz="1800" dirty="0"/>
+          </a:p>
+          <a:p>
+            <a:pPr lvl="1"/>
+            <a:r>
+              <a:rPr lang="de-DE" sz="1800" dirty="0" err="1"/>
+              <a:t>Unclear</a:t>
+            </a:r>
+            <a:endParaRPr lang="de-CH" sz="1800" dirty="0"/>
+          </a:p>
+          <a:p>
+            <a:r>
+              <a:rPr lang="de-CH" sz="1800" dirty="0" err="1"/>
+              <a:t>Spatial</a:t>
+            </a:r>
+            <a:r>
+              <a:rPr lang="de-CH" sz="1800" dirty="0"/>
+              <a:t> </a:t>
+            </a:r>
+            <a:r>
+              <a:rPr lang="de-CH" sz="1800" dirty="0" err="1"/>
+              <a:t>join</a:t>
+            </a:r>
+            <a:r>
+              <a:rPr lang="de-CH" sz="1800" dirty="0"/>
+              <a:t> (</a:t>
+            </a:r>
+            <a:r>
+              <a:rPr lang="de-CH" sz="1800" dirty="0" err="1"/>
+              <a:t>land</a:t>
+            </a:r>
+            <a:r>
+              <a:rPr lang="de-CH" sz="1800" dirty="0"/>
+              <a:t> </a:t>
+            </a:r>
+            <a:r>
+              <a:rPr lang="de-CH" sz="1800" dirty="0" err="1"/>
+              <a:t>use</a:t>
+            </a:r>
+            <a:r>
+              <a:rPr lang="de-CH" sz="1800" dirty="0"/>
+              <a:t> and </a:t>
+            </a:r>
+            <a:r>
+              <a:rPr lang="de-CH" sz="1800" dirty="0" err="1"/>
+              <a:t>vegetation</a:t>
+            </a:r>
+            <a:r>
+              <a:rPr lang="de-CH" sz="1800" dirty="0"/>
+              <a:t> type) </a:t>
+            </a:r>
+            <a:r>
+              <a:rPr lang="de-CH" sz="1800" dirty="0" err="1"/>
+              <a:t>for</a:t>
+            </a:r>
+            <a:r>
+              <a:rPr lang="de-CH" sz="1800" dirty="0"/>
+              <a:t> </a:t>
+            </a:r>
+            <a:r>
+              <a:rPr lang="de-CH" sz="1800" dirty="0" err="1"/>
+              <a:t>context</a:t>
+            </a:r>
+            <a:endParaRPr lang="de-CH" sz="1800" dirty="0"/>
+          </a:p>
+          <a:p>
+            <a:r>
+              <a:rPr lang="de-CH" sz="1800" dirty="0" err="1"/>
+              <a:t>Identifying</a:t>
+            </a:r>
+            <a:r>
+              <a:rPr lang="de-CH" sz="1800" dirty="0"/>
+              <a:t> </a:t>
+            </a:r>
+            <a:r>
+              <a:rPr lang="de-CH" sz="1800" dirty="0" err="1"/>
+              <a:t>frequently</a:t>
+            </a:r>
+            <a:r>
+              <a:rPr lang="de-CH" sz="1800" dirty="0"/>
+              <a:t> </a:t>
+            </a:r>
+            <a:r>
+              <a:rPr lang="de-CH" sz="1800" dirty="0" err="1"/>
+              <a:t>visited</a:t>
+            </a:r>
+            <a:r>
+              <a:rPr lang="de-CH" sz="1800" dirty="0"/>
+              <a:t> </a:t>
+            </a:r>
+            <a:r>
+              <a:rPr lang="de-CH" sz="1800" dirty="0" err="1"/>
+              <a:t>areas</a:t>
+            </a:r>
+            <a:endParaRPr lang="de-CH" sz="1800" dirty="0"/>
+          </a:p>
+          <a:p>
+            <a:r>
+              <a:rPr lang="de-CH" sz="1800" dirty="0" err="1"/>
+              <a:t>Allocation</a:t>
+            </a:r>
+            <a:r>
+              <a:rPr lang="de-CH" sz="1800" dirty="0"/>
+              <a:t> </a:t>
+            </a:r>
+            <a:r>
+              <a:rPr lang="de-CH" sz="1800" dirty="0" err="1"/>
+              <a:t>of</a:t>
+            </a:r>
+            <a:r>
+              <a:rPr lang="de-CH" sz="1800" dirty="0"/>
+              <a:t> </a:t>
+            </a:r>
+            <a:r>
+              <a:rPr lang="de-CH" sz="1800" dirty="0" err="1"/>
+              <a:t>wallows</a:t>
+            </a:r>
+            <a:r>
+              <a:rPr lang="de-CH" sz="1800" dirty="0"/>
+              <a:t> and </a:t>
+            </a:r>
+            <a:r>
+              <a:rPr lang="de-CH" sz="1800" dirty="0" err="1"/>
+              <a:t>nests</a:t>
+            </a:r>
+            <a:endParaRPr lang="de-CH" sz="1800" dirty="0"/>
+          </a:p>
+          <a:p>
+            <a:r>
+              <a:rPr lang="de-CH" sz="1800" dirty="0" err="1"/>
+              <a:t>Visualisation</a:t>
+            </a:r>
+            <a:r>
+              <a:rPr lang="de-CH" sz="1800" dirty="0"/>
+              <a:t> </a:t>
+            </a:r>
+            <a:r>
+              <a:rPr lang="de-CH" sz="1800" dirty="0" err="1"/>
+              <a:t>of</a:t>
+            </a:r>
+            <a:r>
+              <a:rPr lang="de-CH" sz="1800" dirty="0"/>
+              <a:t> </a:t>
+            </a:r>
+            <a:r>
+              <a:rPr lang="de-CH" sz="1800" dirty="0" err="1"/>
+              <a:t>results</a:t>
+            </a:r>
+            <a:r>
+              <a:rPr lang="de-CH" sz="1800" dirty="0"/>
+              <a:t> </a:t>
+            </a:r>
+            <a:r>
+              <a:rPr lang="de-CH" sz="1800" dirty="0" err="1"/>
+              <a:t>as</a:t>
+            </a:r>
+            <a:r>
+              <a:rPr lang="de-CH" sz="1800" dirty="0"/>
+              <a:t> </a:t>
+            </a:r>
+            <a:r>
+              <a:rPr lang="de-CH" sz="1800" dirty="0" err="1"/>
+              <a:t>convex</a:t>
+            </a:r>
+            <a:r>
+              <a:rPr lang="de-CH" sz="1800" dirty="0"/>
+              <a:t> </a:t>
+            </a:r>
+            <a:r>
+              <a:rPr lang="de-CH" sz="1800" dirty="0" err="1"/>
+              <a:t>hull</a:t>
+            </a:r>
+            <a:endParaRPr lang="de-CH" sz="1800" dirty="0"/>
+          </a:p>
+        </p:txBody>
+      </p:sp>
+    </p:spTree>
+    <p:extLst>
+      <p:ext uri="{BB962C8B-B14F-4D97-AF65-F5344CB8AC3E}">
+        <p14:creationId xmlns:p14="http://schemas.microsoft.com/office/powerpoint/2010/main" val="439354833"/>
+      </p:ext>
+    </p:extLst>
+  </p:cSld>
+  <p:clrMapOvr>
+    <a:overrideClrMapping bg1="dk1" tx1="lt1" bg2="dk2" tx2="lt2" accent1="accent1" accent2="accent2" accent3="accent3" accent4="accent4" accent5="accent5" accent6="accent6" hlink="hlink" folHlink="folHlink"/>
+  </p:clrMapOvr>
+</p:sld>
+</file>
+
+<file path=ppt/slides/slide5.xml><?xml version="1.0" encoding="utf-8"?>
+<p:sld xmlns:a="http://schemas.openxmlformats.org/drawingml/2006/main" xmlns:r="http://schemas.openxmlformats.org/officeDocument/2006/relationships" xmlns:p="http://schemas.openxmlformats.org/presentationml/2006/main">
+  <p:cSld>
+    <p:bg>
+      <p:bgPr>
+        <a:solidFill>
+          <a:schemeClr val="bg1">
+            <a:tint val="95000"/>
+            <a:satMod val="170000"/>
+          </a:schemeClr>
+        </a:solidFill>
+        <a:effectLst/>
+      </p:bgPr>
+    </p:bg>
+    <p:spTree>
+      <p:nvGrpSpPr>
+        <p:cNvPr id="1" name=""/>
+        <p:cNvGrpSpPr/>
+        <p:nvPr/>
+      </p:nvGrpSpPr>
+      <p:grpSpPr>
+        <a:xfrm>
+          <a:off x="0" y="0"/>
+          <a:ext cx="0" cy="0"/>
+          <a:chOff x="0" y="0"/>
+          <a:chExt cx="0" cy="0"/>
+        </a:xfrm>
+      </p:grpSpPr>
+      <p:sp>
+        <p:nvSpPr>
+          <p:cNvPr id="2" name="Titel 1">
+            <a:extLst>
+              <a:ext uri="{FF2B5EF4-FFF2-40B4-BE49-F238E27FC236}">
+                <a16:creationId xmlns:a16="http://schemas.microsoft.com/office/drawing/2014/main" id="{D6066F6D-6130-465C-886F-BF7728193B40}"/>
+              </a:ext>
+            </a:extLst>
+          </p:cNvPr>
+          <p:cNvSpPr>
+            <a:spLocks noGrp="1"/>
+          </p:cNvSpPr>
+          <p:nvPr>
+            <p:ph type="title"/>
+          </p:nvPr>
+        </p:nvSpPr>
+        <p:spPr>
+          <a:xfrm>
+            <a:off x="801098" y="1396289"/>
+            <a:ext cx="5277333" cy="1325563"/>
+          </a:xfrm>
+        </p:spPr>
+        <p:txBody>
+          <a:bodyPr>
+            <a:normAutofit/>
+          </a:bodyPr>
+          <a:lstStyle/>
+          <a:p>
+            <a:r>
+              <a:rPr lang="en-US" dirty="0"/>
+              <a:t>Risk analysis and ideas for plan B</a:t>
+            </a:r>
+            <a:endParaRPr lang="de-CH" dirty="0"/>
+          </a:p>
+        </p:txBody>
+      </p:sp>
+      <p:sp>
+        <p:nvSpPr>
+          <p:cNvPr id="3" name="Inhaltsplatzhalter 2">
+            <a:extLst>
+              <a:ext uri="{FF2B5EF4-FFF2-40B4-BE49-F238E27FC236}">
+                <a16:creationId xmlns:a16="http://schemas.microsoft.com/office/drawing/2014/main" id="{98C39DE5-9BA2-411F-9E02-8CAC33776A3F}"/>
+              </a:ext>
+            </a:extLst>
+          </p:cNvPr>
+          <p:cNvSpPr>
+            <a:spLocks noGrp="1"/>
+          </p:cNvSpPr>
+          <p:nvPr>
+            <p:ph idx="1"/>
+          </p:nvPr>
+        </p:nvSpPr>
+        <p:spPr>
+          <a:xfrm>
+            <a:off x="805543" y="2871982"/>
+            <a:ext cx="5272888" cy="3181684"/>
+          </a:xfrm>
+        </p:spPr>
+        <p:txBody>
+          <a:bodyPr anchor="t">
+            <a:normAutofit/>
+          </a:bodyPr>
+          <a:lstStyle/>
+          <a:p>
+            <a:r>
+              <a:rPr lang="de-DE" sz="1800" dirty="0" err="1"/>
+              <a:t>Finding</a:t>
+            </a:r>
+            <a:r>
+              <a:rPr lang="de-DE" sz="1800" dirty="0"/>
+              <a:t> </a:t>
+            </a:r>
+            <a:r>
+              <a:rPr lang="de-DE" sz="1800" dirty="0" err="1"/>
+              <a:t>clear</a:t>
+            </a:r>
+            <a:r>
+              <a:rPr lang="de-DE" sz="1800" dirty="0"/>
+              <a:t> </a:t>
+            </a:r>
+            <a:r>
+              <a:rPr lang="de-DE" sz="1800" dirty="0" err="1"/>
+              <a:t>criterias</a:t>
+            </a:r>
+            <a:r>
+              <a:rPr lang="de-DE" sz="1800" dirty="0"/>
+              <a:t> </a:t>
+            </a:r>
+            <a:r>
+              <a:rPr lang="de-DE" sz="1800" dirty="0" err="1"/>
+              <a:t>for</a:t>
+            </a:r>
+            <a:r>
+              <a:rPr lang="de-DE" sz="1800" dirty="0"/>
+              <a:t> </a:t>
+            </a:r>
+            <a:r>
+              <a:rPr lang="de-DE" sz="1800" dirty="0" err="1"/>
+              <a:t>the</a:t>
+            </a:r>
+            <a:r>
+              <a:rPr lang="de-DE" sz="1800" dirty="0"/>
+              <a:t> </a:t>
+            </a:r>
+            <a:r>
+              <a:rPr lang="de-DE" sz="1800" dirty="0" err="1"/>
+              <a:t>distinction</a:t>
+            </a:r>
+            <a:r>
+              <a:rPr lang="de-DE" sz="1800" dirty="0"/>
+              <a:t> </a:t>
+            </a:r>
+            <a:r>
+              <a:rPr lang="de-DE" sz="1800" dirty="0" err="1"/>
+              <a:t>between</a:t>
+            </a:r>
+            <a:r>
+              <a:rPr lang="de-DE" sz="1800" dirty="0"/>
+              <a:t> </a:t>
+            </a:r>
+            <a:r>
+              <a:rPr lang="de-DE" sz="1800" dirty="0" err="1"/>
+              <a:t>nests</a:t>
+            </a:r>
+            <a:r>
+              <a:rPr lang="de-DE" sz="1800" dirty="0"/>
+              <a:t> and </a:t>
+            </a:r>
+            <a:r>
+              <a:rPr lang="de-DE" sz="1800" dirty="0" err="1"/>
+              <a:t>wallows</a:t>
+            </a:r>
+            <a:endParaRPr lang="de-DE" sz="1800" dirty="0"/>
+          </a:p>
+          <a:p>
+            <a:r>
+              <a:rPr lang="de-DE" sz="1800" dirty="0"/>
+              <a:t>Plan B: Best </a:t>
+            </a:r>
+            <a:r>
+              <a:rPr lang="de-DE" sz="1800" dirty="0" err="1"/>
+              <a:t>educated</a:t>
+            </a:r>
+            <a:r>
+              <a:rPr lang="de-DE" sz="1800" dirty="0"/>
+              <a:t> </a:t>
+            </a:r>
+            <a:r>
+              <a:rPr lang="de-DE" sz="1800" dirty="0" err="1"/>
+              <a:t>assumption</a:t>
+            </a:r>
+            <a:r>
+              <a:rPr lang="de-DE" sz="1800" dirty="0"/>
+              <a:t> </a:t>
+            </a:r>
+            <a:r>
+              <a:rPr lang="de-DE" sz="1800" dirty="0" err="1"/>
+              <a:t>based</a:t>
+            </a:r>
+            <a:r>
+              <a:rPr lang="de-DE" sz="1800" dirty="0"/>
+              <a:t> on </a:t>
+            </a:r>
+            <a:r>
+              <a:rPr lang="de-DE" sz="1800" dirty="0" err="1"/>
+              <a:t>literature</a:t>
+            </a:r>
+            <a:r>
+              <a:rPr lang="de-DE" sz="1800" dirty="0"/>
+              <a:t> </a:t>
+            </a:r>
+            <a:r>
+              <a:rPr lang="de-DE" sz="1800" dirty="0" err="1"/>
+              <a:t>or</a:t>
+            </a:r>
+            <a:r>
+              <a:rPr lang="de-DE" sz="1800" dirty="0"/>
+              <a:t> </a:t>
+            </a:r>
+            <a:r>
+              <a:rPr lang="de-DE" sz="1800" dirty="0" err="1"/>
+              <a:t>no</a:t>
+            </a:r>
+            <a:r>
+              <a:rPr lang="de-DE" sz="1800" dirty="0"/>
+              <a:t> </a:t>
+            </a:r>
+            <a:r>
+              <a:rPr lang="de-DE" sz="1800" dirty="0" err="1"/>
+              <a:t>differentiation</a:t>
+            </a:r>
+            <a:r>
+              <a:rPr lang="de-DE" sz="1800" dirty="0"/>
+              <a:t> </a:t>
+            </a:r>
+            <a:r>
+              <a:rPr lang="de-DE" sz="1800" dirty="0" err="1"/>
+              <a:t>between</a:t>
+            </a:r>
+            <a:r>
+              <a:rPr lang="de-DE" sz="1800" dirty="0"/>
+              <a:t> </a:t>
+            </a:r>
+            <a:r>
+              <a:rPr lang="de-DE" sz="1800" dirty="0" err="1"/>
+              <a:t>the</a:t>
+            </a:r>
+            <a:r>
+              <a:rPr lang="de-DE" sz="1800" dirty="0"/>
+              <a:t> </a:t>
+            </a:r>
+            <a:r>
+              <a:rPr lang="de-DE" sz="1800" dirty="0" err="1"/>
+              <a:t>two</a:t>
+            </a:r>
+            <a:endParaRPr lang="de-DE" sz="1800" dirty="0"/>
+          </a:p>
+        </p:txBody>
+      </p:sp>
+      <p:sp>
+        <p:nvSpPr>
+          <p:cNvPr id="14" name="Freeform 49">
+            <a:extLst>
+              <a:ext uri="{FF2B5EF4-FFF2-40B4-BE49-F238E27FC236}">
+                <a16:creationId xmlns:a16="http://schemas.microsoft.com/office/drawing/2014/main" id="{EF9B8DF2-C3F5-49A2-94D2-F7B65A0F1F15}"/>
+              </a:ext>
+              <a:ext uri="{C183D7F6-B498-43B3-948B-1728B52AA6E4}">
+                <adec:decorative xmlns:adec="http://schemas.microsoft.com/office/drawing/2017/decorative" val="1"/>
+              </a:ext>
+            </a:extLst>
+          </p:cNvPr>
+          <p:cNvSpPr>
+            <a:spLocks noGrp="1" noRot="1" noChangeAspect="1" noMove="1" noResize="1" noEditPoints="1" noAdjustHandles="1" noChangeArrowheads="1" noChangeShapeType="1" noTextEdit="1"/>
+          </p:cNvSpPr>
+          <p:nvPr>
+            <p:extLst>
+              <p:ext uri="{386F3935-93C4-4BCD-93E2-E3B085C9AB24}">
+                <p16:designElem xmlns:p16="http://schemas.microsoft.com/office/powerpoint/2015/main" val="1"/>
+              </p:ext>
+            </p:extLst>
+          </p:nvPr>
+        </p:nvSpPr>
+        <p:spPr>
+          <a:xfrm flipH="1">
+            <a:off x="6713914" y="581159"/>
+            <a:ext cx="5478085" cy="6276841"/>
+          </a:xfrm>
+          <a:custGeom>
+            <a:avLst/>
+            <a:gdLst>
+              <a:gd name="connsiteX0" fmla="*/ 2178155 w 5478085"/>
+              <a:gd name="connsiteY0" fmla="*/ 0 h 6276841"/>
+              <a:gd name="connsiteX1" fmla="*/ 5478085 w 5478085"/>
+              <a:gd name="connsiteY1" fmla="*/ 3299930 h 6276841"/>
+              <a:gd name="connsiteX2" fmla="*/ 3751098 w 5478085"/>
+              <a:gd name="connsiteY2" fmla="*/ 6201577 h 6276841"/>
+              <a:gd name="connsiteX3" fmla="*/ 3594858 w 5478085"/>
+              <a:gd name="connsiteY3" fmla="*/ 6276841 h 6276841"/>
+              <a:gd name="connsiteX4" fmla="*/ 761453 w 5478085"/>
+              <a:gd name="connsiteY4" fmla="*/ 6276841 h 6276841"/>
+              <a:gd name="connsiteX5" fmla="*/ 605213 w 5478085"/>
+              <a:gd name="connsiteY5" fmla="*/ 6201577 h 6276841"/>
+              <a:gd name="connsiteX6" fmla="*/ 79093 w 5478085"/>
+              <a:gd name="connsiteY6" fmla="*/ 5846317 h 6276841"/>
+              <a:gd name="connsiteX7" fmla="*/ 0 w 5478085"/>
+              <a:gd name="connsiteY7" fmla="*/ 5774432 h 6276841"/>
+              <a:gd name="connsiteX8" fmla="*/ 0 w 5478085"/>
+              <a:gd name="connsiteY8" fmla="*/ 825429 h 6276841"/>
+              <a:gd name="connsiteX9" fmla="*/ 79093 w 5478085"/>
+              <a:gd name="connsiteY9" fmla="*/ 753544 h 6276841"/>
+              <a:gd name="connsiteX10" fmla="*/ 2178155 w 5478085"/>
+              <a:gd name="connsiteY10" fmla="*/ 0 h 6276841"/>
             </a:gdLst>
             <a:ahLst/>
             <a:cxnLst>
@@ -3662,196 +5766,50 @@
               <a:cxn ang="0">
                 <a:pos x="connsiteX10" y="connsiteY10"/>
               </a:cxn>
-              <a:cxn ang="0">
-                <a:pos x="connsiteX11" y="connsiteY11"/>
-              </a:cxn>
-              <a:cxn ang="0">
-                <a:pos x="connsiteX12" y="connsiteY12"/>
-              </a:cxn>
-              <a:cxn ang="0">
-                <a:pos x="connsiteX13" y="connsiteY13"/>
-              </a:cxn>
-              <a:cxn ang="0">
-                <a:pos x="connsiteX14" y="connsiteY14"/>
-              </a:cxn>
-              <a:cxn ang="0">
-                <a:pos x="connsiteX15" y="connsiteY15"/>
-              </a:cxn>
-              <a:cxn ang="0">
-                <a:pos x="connsiteX16" y="connsiteY16"/>
-              </a:cxn>
             </a:cxnLst>
             <a:rect l="l" t="t" r="r" b="b"/>
             <a:pathLst>
-              <a:path w="4243589" h="18288" fill="none" extrusionOk="0">
+              <a:path w="5478085" h="6276841">
                 <a:moveTo>
-                  <a:pt x="0" y="0"/>
+                  <a:pt x="2178155" y="0"/>
                 </a:moveTo>
                 <a:cubicBezTo>
-                  <a:pt x="213395" y="-21006"/>
-                  <a:pt x="307421" y="-18116"/>
-                  <a:pt x="478919" y="0"/>
+                  <a:pt x="4000656" y="0"/>
+                  <a:pt x="5478085" y="1477429"/>
+                  <a:pt x="5478085" y="3299930"/>
                 </a:cubicBezTo>
                 <a:cubicBezTo>
-                  <a:pt x="650417" y="18116"/>
-                  <a:pt x="831092" y="-21237"/>
-                  <a:pt x="957839" y="0"/>
+                  <a:pt x="5478085" y="4552900"/>
+                  <a:pt x="4779769" y="5642769"/>
+                  <a:pt x="3751098" y="6201577"/>
                 </a:cubicBezTo>
+                <a:lnTo>
+                  <a:pt x="3594858" y="6276841"/>
+                </a:lnTo>
+                <a:lnTo>
+                  <a:pt x="761453" y="6276841"/>
+                </a:lnTo>
+                <a:lnTo>
+                  <a:pt x="605213" y="6201577"/>
+                </a:lnTo>
                 <a:cubicBezTo>
-                  <a:pt x="1084586" y="21237"/>
-                  <a:pt x="1301682" y="25124"/>
-                  <a:pt x="1521630" y="0"/>
+                  <a:pt x="418182" y="6099975"/>
+                  <a:pt x="242071" y="5980818"/>
+                  <a:pt x="79093" y="5846317"/>
                 </a:cubicBezTo>
+                <a:lnTo>
+                  <a:pt x="0" y="5774432"/>
+                </a:lnTo>
+                <a:lnTo>
+                  <a:pt x="0" y="825429"/>
+                </a:lnTo>
+                <a:lnTo>
+                  <a:pt x="79093" y="753544"/>
+                </a:lnTo>
                 <a:cubicBezTo>
-                  <a:pt x="1741578" y="-25124"/>
-                  <a:pt x="1970269" y="-29139"/>
-                  <a:pt x="2212729" y="0"/>
-                </a:cubicBezTo>
-                <a:cubicBezTo>
-                  <a:pt x="2455189" y="29139"/>
-                  <a:pt x="2558847" y="-4796"/>
-                  <a:pt x="2734084" y="0"/>
-                </a:cubicBezTo>
-                <a:cubicBezTo>
-                  <a:pt x="2909321" y="4796"/>
-                  <a:pt x="3097217" y="-13409"/>
-                  <a:pt x="3255439" y="0"/>
-                </a:cubicBezTo>
-                <a:cubicBezTo>
-                  <a:pt x="3413662" y="13409"/>
-                  <a:pt x="3979999" y="-10121"/>
-                  <a:pt x="4243589" y="0"/>
-                </a:cubicBezTo>
-                <a:cubicBezTo>
-                  <a:pt x="4244484" y="8974"/>
-                  <a:pt x="4243043" y="9359"/>
-                  <a:pt x="4243589" y="18288"/>
-                </a:cubicBezTo>
-                <a:cubicBezTo>
-                  <a:pt x="4058777" y="31246"/>
-                  <a:pt x="3910348" y="3158"/>
-                  <a:pt x="3594926" y="18288"/>
-                </a:cubicBezTo>
-                <a:cubicBezTo>
-                  <a:pt x="3279504" y="33418"/>
-                  <a:pt x="3319955" y="-3977"/>
-                  <a:pt x="3073571" y="18288"/>
-                </a:cubicBezTo>
-                <a:cubicBezTo>
-                  <a:pt x="2827187" y="40553"/>
-                  <a:pt x="2767387" y="1863"/>
-                  <a:pt x="2552216" y="18288"/>
-                </a:cubicBezTo>
-                <a:cubicBezTo>
-                  <a:pt x="2337046" y="34713"/>
-                  <a:pt x="2181871" y="19527"/>
-                  <a:pt x="1903553" y="18288"/>
-                </a:cubicBezTo>
-                <a:cubicBezTo>
-                  <a:pt x="1625235" y="17049"/>
-                  <a:pt x="1557672" y="24174"/>
-                  <a:pt x="1212454" y="18288"/>
-                </a:cubicBezTo>
-                <a:cubicBezTo>
-                  <a:pt x="867236" y="12402"/>
-                  <a:pt x="874382" y="15627"/>
-                  <a:pt x="733535" y="18288"/>
-                </a:cubicBezTo>
-                <a:cubicBezTo>
-                  <a:pt x="592688" y="20949"/>
-                  <a:pt x="183477" y="14753"/>
-                  <a:pt x="0" y="18288"/>
-                </a:cubicBezTo>
-                <a:cubicBezTo>
-                  <a:pt x="-229" y="14222"/>
-                  <a:pt x="509" y="5816"/>
-                  <a:pt x="0" y="0"/>
-                </a:cubicBezTo>
-                <a:close/>
-              </a:path>
-              <a:path w="4243589" h="18288" stroke="0" extrusionOk="0">
-                <a:moveTo>
-                  <a:pt x="0" y="0"/>
-                </a:moveTo>
-                <a:cubicBezTo>
-                  <a:pt x="143690" y="16630"/>
-                  <a:pt x="266667" y="14847"/>
-                  <a:pt x="521355" y="0"/>
-                </a:cubicBezTo>
-                <a:cubicBezTo>
-                  <a:pt x="776043" y="-14847"/>
-                  <a:pt x="814491" y="-17363"/>
-                  <a:pt x="1000275" y="0"/>
-                </a:cubicBezTo>
-                <a:cubicBezTo>
-                  <a:pt x="1186059" y="17363"/>
-                  <a:pt x="1352504" y="-23507"/>
-                  <a:pt x="1521630" y="0"/>
-                </a:cubicBezTo>
-                <a:cubicBezTo>
-                  <a:pt x="1690756" y="23507"/>
-                  <a:pt x="1889525" y="5871"/>
-                  <a:pt x="2127857" y="0"/>
-                </a:cubicBezTo>
-                <a:cubicBezTo>
-                  <a:pt x="2366189" y="-5871"/>
-                  <a:pt x="2620628" y="-27997"/>
-                  <a:pt x="2776520" y="0"/>
-                </a:cubicBezTo>
-                <a:cubicBezTo>
-                  <a:pt x="2932412" y="27997"/>
-                  <a:pt x="3131683" y="-25073"/>
-                  <a:pt x="3467618" y="0"/>
-                </a:cubicBezTo>
-                <a:cubicBezTo>
-                  <a:pt x="3803553" y="25073"/>
-                  <a:pt x="4017371" y="3071"/>
-                  <a:pt x="4243589" y="0"/>
-                </a:cubicBezTo>
-                <a:cubicBezTo>
-                  <a:pt x="4243134" y="6162"/>
-                  <a:pt x="4243492" y="11775"/>
-                  <a:pt x="4243589" y="18288"/>
-                </a:cubicBezTo>
-                <a:cubicBezTo>
-                  <a:pt x="4017834" y="-5779"/>
-                  <a:pt x="3834586" y="13376"/>
-                  <a:pt x="3594926" y="18288"/>
-                </a:cubicBezTo>
-                <a:cubicBezTo>
-                  <a:pt x="3355266" y="23200"/>
-                  <a:pt x="3204179" y="2869"/>
-                  <a:pt x="2903827" y="18288"/>
-                </a:cubicBezTo>
-                <a:cubicBezTo>
-                  <a:pt x="2603475" y="33707"/>
-                  <a:pt x="2526187" y="46187"/>
-                  <a:pt x="2212729" y="18288"/>
-                </a:cubicBezTo>
-                <a:cubicBezTo>
-                  <a:pt x="1899271" y="-9611"/>
-                  <a:pt x="1966289" y="29692"/>
-                  <a:pt x="1733809" y="18288"/>
-                </a:cubicBezTo>
-                <a:cubicBezTo>
-                  <a:pt x="1501329" y="6884"/>
-                  <a:pt x="1343612" y="12492"/>
-                  <a:pt x="1085146" y="18288"/>
-                </a:cubicBezTo>
-                <a:cubicBezTo>
-                  <a:pt x="826680" y="24084"/>
-                  <a:pt x="778184" y="35607"/>
-                  <a:pt x="521355" y="18288"/>
-                </a:cubicBezTo>
-                <a:cubicBezTo>
-                  <a:pt x="264526" y="969"/>
-                  <a:pt x="120277" y="4268"/>
-                  <a:pt x="0" y="18288"/>
-                </a:cubicBezTo>
-                <a:cubicBezTo>
-                  <a:pt x="766" y="10800"/>
-                  <a:pt x="-457" y="8180"/>
-                  <a:pt x="0" y="0"/>
+                  <a:pt x="649516" y="282789"/>
+                  <a:pt x="1380811" y="0"/>
+                  <a:pt x="2178155" y="0"/>
                 </a:cubicBezTo>
                 <a:close/>
               </a:path>
@@ -3859,28 +5817,11 @@
           </a:custGeom>
           <a:solidFill>
             <a:srgbClr val="FFFFFF">
-              <a:alpha val="75000"/>
+              <a:alpha val="80000"/>
             </a:srgbClr>
           </a:solidFill>
-          <a:ln w="44450" cap="rnd">
-            <a:solidFill>
-              <a:srgbClr val="FFFFFF">
-                <a:alpha val="75000"/>
-              </a:srgbClr>
-            </a:solidFill>
-            <a:round/>
-            <a:extLst>
-              <a:ext uri="{C807C97D-BFC1-408E-A445-0C87EB9F89A2}">
-                <ask:lineSketchStyleProps xmlns:ask="http://schemas.microsoft.com/office/drawing/2018/sketchyshapes" sd="2727557108">
-                  <a:prstGeom prst="rect">
-                    <a:avLst/>
-                  </a:prstGeom>
-                  <ask:type>
-                    <ask:lineSketchFreehand/>
-                  </ask:type>
-                </ask:lineSketchStyleProps>
-              </a:ext>
-            </a:extLst>
+          <a:ln w="31750">
+            <a:noFill/>
           </a:ln>
         </p:spPr>
         <p:style>
@@ -3900,261 +5841,250 @@
           </a:fontRef>
         </p:style>
         <p:txBody>
-          <a:bodyPr rtlCol="0" anchor="ctr"/>
-          <a:lstStyle/>
-          <a:p>
-            <a:pPr algn="ctr"/>
-            <a:endParaRPr lang="en-US"/>
-          </a:p>
-        </p:txBody>
-      </p:sp>
-      <p:sp>
-        <p:nvSpPr>
-          <p:cNvPr id="5" name="Rechteck 4">
-            <a:extLst>
-              <a:ext uri="{FF2B5EF4-FFF2-40B4-BE49-F238E27FC236}">
-                <a16:creationId xmlns:a16="http://schemas.microsoft.com/office/drawing/2014/main" id="{954F8563-AC4C-400C-83FA-368F0A889936}"/>
-              </a:ext>
-            </a:extLst>
-          </p:cNvPr>
-          <p:cNvSpPr/>
-          <p:nvPr/>
+          <a:bodyPr wrap="square" rtlCol="0" anchor="ctr">
+            <a:noAutofit/>
+          </a:bodyPr>
+          <a:lstStyle/>
+          <a:p>
+            <a:pPr marL="0" marR="0" lvl="0" indent="0" algn="ctr" defTabSz="914400" rtl="0" eaLnBrk="1" fontAlgn="auto" latinLnBrk="0" hangingPunct="1">
+              <a:lnSpc>
+                <a:spcPct val="100000"/>
+              </a:lnSpc>
+              <a:spcBef>
+                <a:spcPts val="0"/>
+              </a:spcBef>
+              <a:spcAft>
+                <a:spcPts val="0"/>
+              </a:spcAft>
+              <a:buClrTx/>
+              <a:buSzTx/>
+              <a:buFontTx/>
+              <a:buNone/>
+              <a:tabLst/>
+              <a:defRPr/>
+            </a:pPr>
+            <a:endParaRPr kumimoji="0" lang="en-US" sz="1800" b="0" i="0" u="none" strike="noStrike" kern="1200" cap="none" spc="0" normalizeH="0" baseline="0" noProof="0">
+              <a:ln>
+                <a:noFill/>
+              </a:ln>
+              <a:solidFill>
+                <a:prstClr val="white"/>
+              </a:solidFill>
+              <a:effectLst/>
+              <a:uLnTx/>
+              <a:uFillTx/>
+              <a:latin typeface="Calibri" panose="020F0502020204030204"/>
+              <a:ea typeface="+mn-ea"/>
+              <a:cs typeface="+mn-cs"/>
+            </a:endParaRPr>
+          </a:p>
+        </p:txBody>
+      </p:sp>
+      <p:sp>
+        <p:nvSpPr>
+          <p:cNvPr id="15" name="Freeform: Shape 11">
+            <a:extLst>
+              <a:ext uri="{FF2B5EF4-FFF2-40B4-BE49-F238E27FC236}">
+                <a16:creationId xmlns:a16="http://schemas.microsoft.com/office/drawing/2014/main" id="{4330B6AC-E6AB-45E4-A303-C8DE90EB2AAC}"/>
+              </a:ext>
+              <a:ext uri="{C183D7F6-B498-43B3-948B-1728B52AA6E4}">
+                <adec:decorative xmlns:adec="http://schemas.microsoft.com/office/drawing/2017/decorative" val="1"/>
+              </a:ext>
+            </a:extLst>
+          </p:cNvPr>
+          <p:cNvSpPr>
+            <a:spLocks noGrp="1" noRot="1" noChangeAspect="1" noMove="1" noResize="1" noEditPoints="1" noAdjustHandles="1" noChangeArrowheads="1" noChangeShapeType="1" noTextEdit="1"/>
+          </p:cNvSpPr>
+          <p:nvPr>
+            <p:extLst>
+              <p:ext uri="{386F3935-93C4-4BCD-93E2-E3B085C9AB24}">
+                <p16:designElem xmlns:p16="http://schemas.microsoft.com/office/powerpoint/2015/main" val="1"/>
+              </p:ext>
+            </p:extLst>
+          </p:nvPr>
         </p:nvSpPr>
         <p:spPr>
           <a:xfrm>
-            <a:off x="0" y="6173646"/>
-            <a:ext cx="11550883" cy="615553"/>
+            <a:off x="6893318" y="760562"/>
+            <a:ext cx="5298683" cy="6097438"/>
           </a:xfrm>
-          <a:prstGeom prst="rect">
+          <a:custGeom>
             <a:avLst/>
-          </a:prstGeom>
+            <a:gdLst>
+              <a:gd name="connsiteX0" fmla="*/ 3120528 w 5298683"/>
+              <a:gd name="connsiteY0" fmla="*/ 0 h 6097438"/>
+              <a:gd name="connsiteX1" fmla="*/ 5105473 w 5298683"/>
+              <a:gd name="connsiteY1" fmla="*/ 712577 h 6097438"/>
+              <a:gd name="connsiteX2" fmla="*/ 5298683 w 5298683"/>
+              <a:gd name="connsiteY2" fmla="*/ 888178 h 6097438"/>
+              <a:gd name="connsiteX3" fmla="*/ 5298683 w 5298683"/>
+              <a:gd name="connsiteY3" fmla="*/ 5352876 h 6097438"/>
+              <a:gd name="connsiteX4" fmla="*/ 5105473 w 5298683"/>
+              <a:gd name="connsiteY4" fmla="*/ 5528477 h 6097438"/>
+              <a:gd name="connsiteX5" fmla="*/ 4335177 w 5298683"/>
+              <a:gd name="connsiteY5" fmla="*/ 5995828 h 6097438"/>
+              <a:gd name="connsiteX6" fmla="*/ 4057556 w 5298683"/>
+              <a:gd name="connsiteY6" fmla="*/ 6097438 h 6097438"/>
+              <a:gd name="connsiteX7" fmla="*/ 2183499 w 5298683"/>
+              <a:gd name="connsiteY7" fmla="*/ 6097438 h 6097438"/>
+              <a:gd name="connsiteX8" fmla="*/ 1905878 w 5298683"/>
+              <a:gd name="connsiteY8" fmla="*/ 5995828 h 6097438"/>
+              <a:gd name="connsiteX9" fmla="*/ 0 w 5298683"/>
+              <a:gd name="connsiteY9" fmla="*/ 3120527 h 6097438"/>
+              <a:gd name="connsiteX10" fmla="*/ 3120528 w 5298683"/>
+              <a:gd name="connsiteY10" fmla="*/ 0 h 6097438"/>
+            </a:gdLst>
+            <a:ahLst/>
+            <a:cxnLst>
+              <a:cxn ang="0">
+                <a:pos x="connsiteX0" y="connsiteY0"/>
+              </a:cxn>
+              <a:cxn ang="0">
+                <a:pos x="connsiteX1" y="connsiteY1"/>
+              </a:cxn>
+              <a:cxn ang="0">
+                <a:pos x="connsiteX2" y="connsiteY2"/>
+              </a:cxn>
+              <a:cxn ang="0">
+                <a:pos x="connsiteX3" y="connsiteY3"/>
+              </a:cxn>
+              <a:cxn ang="0">
+                <a:pos x="connsiteX4" y="connsiteY4"/>
+              </a:cxn>
+              <a:cxn ang="0">
+                <a:pos x="connsiteX5" y="connsiteY5"/>
+              </a:cxn>
+              <a:cxn ang="0">
+                <a:pos x="connsiteX6" y="connsiteY6"/>
+              </a:cxn>
+              <a:cxn ang="0">
+                <a:pos x="connsiteX7" y="connsiteY7"/>
+              </a:cxn>
+              <a:cxn ang="0">
+                <a:pos x="connsiteX8" y="connsiteY8"/>
+              </a:cxn>
+              <a:cxn ang="0">
+                <a:pos x="connsiteX9" y="connsiteY9"/>
+              </a:cxn>
+              <a:cxn ang="0">
+                <a:pos x="connsiteX10" y="connsiteY10"/>
+              </a:cxn>
+            </a:cxnLst>
+            <a:rect l="l" t="t" r="r" b="b"/>
+            <a:pathLst>
+              <a:path w="5298683" h="6097438">
+                <a:moveTo>
+                  <a:pt x="3120528" y="0"/>
+                </a:moveTo>
+                <a:cubicBezTo>
+                  <a:pt x="3874524" y="0"/>
+                  <a:pt x="4566062" y="267415"/>
+                  <a:pt x="5105473" y="712577"/>
+                </a:cubicBezTo>
+                <a:lnTo>
+                  <a:pt x="5298683" y="888178"/>
+                </a:lnTo>
+                <a:lnTo>
+                  <a:pt x="5298683" y="5352876"/>
+                </a:lnTo>
+                <a:lnTo>
+                  <a:pt x="5105473" y="5528477"/>
+                </a:lnTo>
+                <a:cubicBezTo>
+                  <a:pt x="4874296" y="5719261"/>
+                  <a:pt x="4615179" y="5877397"/>
+                  <a:pt x="4335177" y="5995828"/>
+                </a:cubicBezTo>
+                <a:lnTo>
+                  <a:pt x="4057556" y="6097438"/>
+                </a:lnTo>
+                <a:lnTo>
+                  <a:pt x="2183499" y="6097438"/>
+                </a:lnTo>
+                <a:lnTo>
+                  <a:pt x="1905878" y="5995828"/>
+                </a:lnTo>
+                <a:cubicBezTo>
+                  <a:pt x="785873" y="5522106"/>
+                  <a:pt x="0" y="4413092"/>
+                  <a:pt x="0" y="3120527"/>
+                </a:cubicBezTo>
+                <a:cubicBezTo>
+                  <a:pt x="0" y="1397108"/>
+                  <a:pt x="1397108" y="0"/>
+                  <a:pt x="3120528" y="0"/>
+                </a:cubicBezTo>
+                <a:close/>
+              </a:path>
+            </a:pathLst>
+          </a:custGeom>
+          <a:solidFill>
+            <a:schemeClr val="tx1"/>
+          </a:solidFill>
+          <a:ln>
+            <a:noFill/>
+          </a:ln>
         </p:spPr>
-        <p:txBody>
-          <a:bodyPr wrap="square">
-            <a:spAutoFit/>
-          </a:bodyPr>
-          <a:lstStyle/>
-          <a:p>
-            <a:endParaRPr lang="de-CH" dirty="0">
+        <p:style>
+          <a:lnRef idx="2">
+            <a:schemeClr val="accent1">
+              <a:shade val="50000"/>
+            </a:schemeClr>
+          </a:lnRef>
+          <a:fillRef idx="1">
+            <a:schemeClr val="accent1"/>
+          </a:fillRef>
+          <a:effectRef idx="0">
+            <a:schemeClr val="accent1"/>
+          </a:effectRef>
+          <a:fontRef idx="minor">
+            <a:schemeClr val="lt1"/>
+          </a:fontRef>
+        </p:style>
+        <p:txBody>
+          <a:bodyPr rtlCol="0" anchor="ctr"/>
+          <a:lstStyle/>
+          <a:p>
+            <a:pPr marL="0" marR="0" lvl="0" indent="0" algn="ctr" defTabSz="914400" rtl="0" eaLnBrk="1" fontAlgn="auto" latinLnBrk="0" hangingPunct="1">
+              <a:lnSpc>
+                <a:spcPct val="100000"/>
+              </a:lnSpc>
+              <a:spcBef>
+                <a:spcPts val="0"/>
+              </a:spcBef>
+              <a:spcAft>
+                <a:spcPts val="0"/>
+              </a:spcAft>
+              <a:buClrTx/>
+              <a:buSzTx/>
+              <a:buFontTx/>
+              <a:buNone/>
+              <a:tabLst/>
+              <a:defRPr/>
+            </a:pPr>
+            <a:endParaRPr kumimoji="0" lang="en-US" sz="1800" b="0" i="0" u="none" strike="noStrike" kern="1200" cap="none" spc="0" normalizeH="0" baseline="0" noProof="0">
+              <a:ln>
+                <a:noFill/>
+              </a:ln>
               <a:solidFill>
-                <a:srgbClr val="FFFFFF"/>
+                <a:prstClr val="white"/>
               </a:solidFill>
+              <a:effectLst/>
+              <a:uLnTx/>
+              <a:uFillTx/>
+              <a:latin typeface="Calibri" panose="020F0502020204030204"/>
+              <a:ea typeface="+mn-ea"/>
+              <a:cs typeface="+mn-cs"/>
             </a:endParaRPr>
-          </a:p>
-          <a:p>
-            <a:r>
-              <a:rPr lang="de-CH" sz="1600" dirty="0">
-                <a:solidFill>
-                  <a:srgbClr val="FFFFFF"/>
-                </a:solidFill>
-              </a:rPr>
-              <a:t>Source: https://www.noble.org/globalassets/images/news/ag-publications/nf-wf-10-01/hog-wallow.jpg</a:t>
-            </a:r>
-          </a:p>
-        </p:txBody>
-      </p:sp>
-    </p:spTree>
-    <p:extLst>
-      <p:ext uri="{BB962C8B-B14F-4D97-AF65-F5344CB8AC3E}">
-        <p14:creationId xmlns:p14="http://schemas.microsoft.com/office/powerpoint/2010/main" val="933474705"/>
-      </p:ext>
-    </p:extLst>
-  </p:cSld>
-  <p:clrMapOvr>
-    <a:overrideClrMapping bg1="dk1" tx1="lt1" bg2="dk2" tx2="lt2" accent1="accent1" accent2="accent2" accent3="accent3" accent4="accent4" accent5="accent5" accent6="accent6" hlink="hlink" folHlink="folHlink"/>
-  </p:clrMapOvr>
-</p:sld>
-</file>
-
-<file path=ppt/slides/slide2.xml><?xml version="1.0" encoding="utf-8"?>
-<p:sld xmlns:a="http://schemas.openxmlformats.org/drawingml/2006/main" xmlns:r="http://schemas.openxmlformats.org/officeDocument/2006/relationships" xmlns:p="http://schemas.openxmlformats.org/presentationml/2006/main">
-  <p:cSld>
-    <p:spTree>
-      <p:nvGrpSpPr>
-        <p:cNvPr id="1" name=""/>
-        <p:cNvGrpSpPr/>
-        <p:nvPr/>
-      </p:nvGrpSpPr>
-      <p:grpSpPr>
-        <a:xfrm>
-          <a:off x="0" y="0"/>
-          <a:ext cx="0" cy="0"/>
-          <a:chOff x="0" y="0"/>
-          <a:chExt cx="0" cy="0"/>
-        </a:xfrm>
-      </p:grpSpPr>
-      <p:sp>
-        <p:nvSpPr>
-          <p:cNvPr id="2" name="Titel 1">
-            <a:extLst>
-              <a:ext uri="{FF2B5EF4-FFF2-40B4-BE49-F238E27FC236}">
-                <a16:creationId xmlns:a16="http://schemas.microsoft.com/office/drawing/2014/main" id="{10C3736A-78E0-4C9B-9995-2A4FB2039878}"/>
-              </a:ext>
-            </a:extLst>
-          </p:cNvPr>
-          <p:cNvSpPr>
-            <a:spLocks noGrp="1"/>
-          </p:cNvSpPr>
-          <p:nvPr>
-            <p:ph type="title"/>
-          </p:nvPr>
-        </p:nvSpPr>
-        <p:spPr/>
-        <p:txBody>
-          <a:bodyPr/>
-          <a:lstStyle/>
-          <a:p>
-            <a:r>
-              <a:rPr lang="de-DE" dirty="0" err="1"/>
-              <a:t>Context</a:t>
-            </a:r>
-            <a:endParaRPr lang="de-CH" dirty="0"/>
-          </a:p>
-        </p:txBody>
-      </p:sp>
-      <p:sp>
-        <p:nvSpPr>
-          <p:cNvPr id="3" name="Inhaltsplatzhalter 2">
-            <a:extLst>
-              <a:ext uri="{FF2B5EF4-FFF2-40B4-BE49-F238E27FC236}">
-                <a16:creationId xmlns:a16="http://schemas.microsoft.com/office/drawing/2014/main" id="{E3A0EFD4-1EF2-4E90-81B7-2033FCC46013}"/>
-              </a:ext>
-            </a:extLst>
-          </p:cNvPr>
-          <p:cNvSpPr>
-            <a:spLocks noGrp="1"/>
-          </p:cNvSpPr>
-          <p:nvPr>
-            <p:ph idx="1"/>
-          </p:nvPr>
-        </p:nvSpPr>
-        <p:spPr>
-          <a:xfrm>
-            <a:off x="838200" y="1825625"/>
-            <a:ext cx="10515600" cy="4799110"/>
-          </a:xfrm>
-        </p:spPr>
-        <p:txBody>
-          <a:bodyPr>
-            <a:normAutofit fontScale="92500" lnSpcReduction="20000"/>
-          </a:bodyPr>
-          <a:lstStyle/>
-          <a:p>
-            <a:r>
-              <a:rPr lang="en-US" dirty="0">
-                <a:solidFill>
-                  <a:srgbClr val="FF0000"/>
-                </a:solidFill>
-              </a:rPr>
-              <a:t>Context of your project </a:t>
-            </a:r>
-          </a:p>
-          <a:p>
-            <a:pPr marL="0" indent="0">
-              <a:buNone/>
-            </a:pPr>
-            <a:r>
-              <a:rPr lang="en-US" dirty="0">
-                <a:solidFill>
-                  <a:srgbClr val="FF0000"/>
-                </a:solidFill>
-              </a:rPr>
-              <a:t>(application area, conceptual models,</a:t>
-            </a:r>
-          </a:p>
-          <a:p>
-            <a:pPr marL="0" indent="0">
-              <a:buNone/>
-            </a:pPr>
-            <a:r>
-              <a:rPr lang="en-US" dirty="0">
-                <a:solidFill>
-                  <a:srgbClr val="FF0000"/>
-                </a:solidFill>
-              </a:rPr>
-              <a:t> data structures, available data) </a:t>
-            </a:r>
-          </a:p>
-          <a:p>
-            <a:pPr marL="0" indent="0">
-              <a:buNone/>
-            </a:pPr>
-            <a:endParaRPr lang="en-US" dirty="0"/>
-          </a:p>
-          <a:p>
-            <a:pPr marL="0" indent="0">
-              <a:buNone/>
-            </a:pPr>
-            <a:r>
-              <a:rPr lang="en-GB" dirty="0"/>
-              <a:t>Used data</a:t>
-            </a:r>
-          </a:p>
-          <a:p>
-            <a:r>
-              <a:rPr lang="en-GB" dirty="0"/>
-              <a:t>Wild boar movement data and metadata¹</a:t>
-            </a:r>
-          </a:p>
-          <a:p>
-            <a:r>
-              <a:rPr lang="en-GB" dirty="0"/>
-              <a:t>Field and vegetation type of surroundings¹</a:t>
-            </a:r>
-          </a:p>
-          <a:p>
-            <a:r>
-              <a:rPr lang="en-GB" dirty="0"/>
-              <a:t>Area statistics and vegetation height²</a:t>
-            </a:r>
-          </a:p>
-          <a:p>
-            <a:endParaRPr lang="en-GB" dirty="0"/>
-          </a:p>
-          <a:p>
-            <a:pPr marL="0" indent="0">
-              <a:buNone/>
-            </a:pPr>
-            <a:r>
-              <a:rPr lang="en-GB" sz="2000" dirty="0"/>
-              <a:t>¹Retrieved from ZHAW research project "Prevention of Wild Boar Damage in Agriculture“ </a:t>
-            </a:r>
-          </a:p>
-          <a:p>
-            <a:pPr marL="0" indent="0">
-              <a:buNone/>
-            </a:pPr>
-            <a:r>
-              <a:rPr lang="en-GB" sz="2000" dirty="0"/>
-              <a:t>²Retrieved from </a:t>
-            </a:r>
-            <a:r>
-              <a:rPr lang="en-GB" sz="2000" dirty="0" err="1"/>
-              <a:t>swisstopo</a:t>
-            </a:r>
-            <a:endParaRPr lang="en-GB" sz="2000" dirty="0"/>
-          </a:p>
-          <a:p>
-            <a:pPr marL="0" indent="0">
-              <a:buNone/>
-            </a:pPr>
-            <a:r>
-              <a:rPr lang="de-CH" sz="1500" dirty="0"/>
-              <a:t>Sources: http://www.suwanneeriverranch.com/photos/HogsWaterTwo.jpg, </a:t>
-            </a:r>
-            <a:r>
-              <a:rPr lang="en-GB" sz="1500" dirty="0"/>
-              <a:t>http://aws.fuzzytravel.com/nimfi/pictures/66555.jpg</a:t>
-            </a:r>
           </a:p>
         </p:txBody>
       </p:sp>
       <p:pic>
         <p:nvPicPr>
-          <p:cNvPr id="7" name="Grafik 6" descr="Ein Bild, das Gras, draußen, Säugetier enthält.&#10;&#10;Automatisch generierte Beschreibung">
-            <a:extLst>
-              <a:ext uri="{FF2B5EF4-FFF2-40B4-BE49-F238E27FC236}">
-                <a16:creationId xmlns:a16="http://schemas.microsoft.com/office/drawing/2014/main" id="{300646DE-663C-4CFD-981E-EB35F462FDFF}"/>
+          <p:cNvPr id="16" name="Graphic 6" descr="Fehler">
+            <a:extLst>
+              <a:ext uri="{FF2B5EF4-FFF2-40B4-BE49-F238E27FC236}">
+                <a16:creationId xmlns:a16="http://schemas.microsoft.com/office/drawing/2014/main" id="{E495A0A1-85E3-47B3-9B29-9AB9612BC3EC}"/>
               </a:ext>
             </a:extLst>
           </p:cNvPr>
@@ -4169,6 +6099,9 @@
               <a:ext uri="{28A0092B-C50C-407E-A947-70E740481C1C}">
                 <a14:useLocalDpi xmlns:a14="http://schemas.microsoft.com/office/drawing/2010/main" val="0"/>
               </a:ext>
+              <a:ext uri="{96DAC541-7B7A-43D3-8B79-37D633B846F1}">
+                <asvg:svgBlip xmlns:asvg="http://schemas.microsoft.com/office/drawing/2016/SVG/main" r:embed="rId3"/>
+              </a:ext>
             </a:extLst>
           </a:blip>
           <a:stretch>
@@ -4177,639 +6110,8 @@
         </p:blipFill>
         <p:spPr>
           <a:xfrm>
-            <a:off x="9787813" y="493149"/>
-            <a:ext cx="2007041" cy="2664951"/>
-          </a:xfrm>
-          <a:prstGeom prst="rect">
-            <a:avLst/>
-          </a:prstGeom>
-        </p:spPr>
-      </p:pic>
-      <p:sp>
-        <p:nvSpPr>
-          <p:cNvPr id="8" name="Inhaltsplatzhalter 2">
-            <a:extLst>
-              <a:ext uri="{FF2B5EF4-FFF2-40B4-BE49-F238E27FC236}">
-                <a16:creationId xmlns:a16="http://schemas.microsoft.com/office/drawing/2014/main" id="{ECB01B49-B309-4DA0-85FD-F590BB993A49}"/>
-              </a:ext>
-            </a:extLst>
-          </p:cNvPr>
-          <p:cNvSpPr txBox="1">
-            <a:spLocks/>
-          </p:cNvSpPr>
-          <p:nvPr/>
-        </p:nvSpPr>
-        <p:spPr>
-          <a:xfrm>
-            <a:off x="9787813" y="3286124"/>
-            <a:ext cx="1752600" cy="466595"/>
-          </a:xfrm>
-          <a:prstGeom prst="rect">
-            <a:avLst/>
-          </a:prstGeom>
-        </p:spPr>
-        <p:txBody>
-          <a:bodyPr vert="horz" lIns="91440" tIns="45720" rIns="91440" bIns="45720" rtlCol="0">
-            <a:normAutofit lnSpcReduction="10000"/>
-          </a:bodyPr>
-          <a:lstStyle>
-            <a:lvl1pPr marL="228600" indent="-228600" algn="l" defTabSz="914400" rtl="0" eaLnBrk="1" latinLnBrk="0" hangingPunct="1">
-              <a:lnSpc>
-                <a:spcPct val="90000"/>
-              </a:lnSpc>
-              <a:spcBef>
-                <a:spcPts val="1000"/>
-              </a:spcBef>
-              <a:buFont typeface="Arial" panose="020B0604020202020204" pitchFamily="34" charset="0"/>
-              <a:buChar char="•"/>
-              <a:defRPr sz="2800" kern="1200">
-                <a:solidFill>
-                  <a:schemeClr val="tx1"/>
-                </a:solidFill>
-                <a:latin typeface="+mn-lt"/>
-                <a:ea typeface="+mn-ea"/>
-                <a:cs typeface="+mn-cs"/>
-              </a:defRPr>
-            </a:lvl1pPr>
-            <a:lvl2pPr marL="685800" indent="-228600" algn="l" defTabSz="914400" rtl="0" eaLnBrk="1" latinLnBrk="0" hangingPunct="1">
-              <a:lnSpc>
-                <a:spcPct val="90000"/>
-              </a:lnSpc>
-              <a:spcBef>
-                <a:spcPts val="500"/>
-              </a:spcBef>
-              <a:buFont typeface="Arial" panose="020B0604020202020204" pitchFamily="34" charset="0"/>
-              <a:buChar char="•"/>
-              <a:defRPr sz="2400" kern="1200">
-                <a:solidFill>
-                  <a:schemeClr val="tx1"/>
-                </a:solidFill>
-                <a:latin typeface="+mn-lt"/>
-                <a:ea typeface="+mn-ea"/>
-                <a:cs typeface="+mn-cs"/>
-              </a:defRPr>
-            </a:lvl2pPr>
-            <a:lvl3pPr marL="1143000" indent="-228600" algn="l" defTabSz="914400" rtl="0" eaLnBrk="1" latinLnBrk="0" hangingPunct="1">
-              <a:lnSpc>
-                <a:spcPct val="90000"/>
-              </a:lnSpc>
-              <a:spcBef>
-                <a:spcPts val="500"/>
-              </a:spcBef>
-              <a:buFont typeface="Arial" panose="020B0604020202020204" pitchFamily="34" charset="0"/>
-              <a:buChar char="•"/>
-              <a:defRPr sz="2000" kern="1200">
-                <a:solidFill>
-                  <a:schemeClr val="tx1"/>
-                </a:solidFill>
-                <a:latin typeface="+mn-lt"/>
-                <a:ea typeface="+mn-ea"/>
-                <a:cs typeface="+mn-cs"/>
-              </a:defRPr>
-            </a:lvl3pPr>
-            <a:lvl4pPr marL="1600200" indent="-228600" algn="l" defTabSz="914400" rtl="0" eaLnBrk="1" latinLnBrk="0" hangingPunct="1">
-              <a:lnSpc>
-                <a:spcPct val="90000"/>
-              </a:lnSpc>
-              <a:spcBef>
-                <a:spcPts val="500"/>
-              </a:spcBef>
-              <a:buFont typeface="Arial" panose="020B0604020202020204" pitchFamily="34" charset="0"/>
-              <a:buChar char="•"/>
-              <a:defRPr sz="1800" kern="1200">
-                <a:solidFill>
-                  <a:schemeClr val="tx1"/>
-                </a:solidFill>
-                <a:latin typeface="+mn-lt"/>
-                <a:ea typeface="+mn-ea"/>
-                <a:cs typeface="+mn-cs"/>
-              </a:defRPr>
-            </a:lvl4pPr>
-            <a:lvl5pPr marL="2057400" indent="-228600" algn="l" defTabSz="914400" rtl="0" eaLnBrk="1" latinLnBrk="0" hangingPunct="1">
-              <a:lnSpc>
-                <a:spcPct val="90000"/>
-              </a:lnSpc>
-              <a:spcBef>
-                <a:spcPts val="500"/>
-              </a:spcBef>
-              <a:buFont typeface="Arial" panose="020B0604020202020204" pitchFamily="34" charset="0"/>
-              <a:buChar char="•"/>
-              <a:defRPr sz="1800" kern="1200">
-                <a:solidFill>
-                  <a:schemeClr val="tx1"/>
-                </a:solidFill>
-                <a:latin typeface="+mn-lt"/>
-                <a:ea typeface="+mn-ea"/>
-                <a:cs typeface="+mn-cs"/>
-              </a:defRPr>
-            </a:lvl5pPr>
-            <a:lvl6pPr marL="2514600" indent="-228600" algn="l" defTabSz="914400" rtl="0" eaLnBrk="1" latinLnBrk="0" hangingPunct="1">
-              <a:lnSpc>
-                <a:spcPct val="90000"/>
-              </a:lnSpc>
-              <a:spcBef>
-                <a:spcPts val="500"/>
-              </a:spcBef>
-              <a:buFont typeface="Arial" panose="020B0604020202020204" pitchFamily="34" charset="0"/>
-              <a:buChar char="•"/>
-              <a:defRPr sz="1800" kern="1200">
-                <a:solidFill>
-                  <a:schemeClr val="tx1"/>
-                </a:solidFill>
-                <a:latin typeface="+mn-lt"/>
-                <a:ea typeface="+mn-ea"/>
-                <a:cs typeface="+mn-cs"/>
-              </a:defRPr>
-            </a:lvl6pPr>
-            <a:lvl7pPr marL="2971800" indent="-228600" algn="l" defTabSz="914400" rtl="0" eaLnBrk="1" latinLnBrk="0" hangingPunct="1">
-              <a:lnSpc>
-                <a:spcPct val="90000"/>
-              </a:lnSpc>
-              <a:spcBef>
-                <a:spcPts val="500"/>
-              </a:spcBef>
-              <a:buFont typeface="Arial" panose="020B0604020202020204" pitchFamily="34" charset="0"/>
-              <a:buChar char="•"/>
-              <a:defRPr sz="1800" kern="1200">
-                <a:solidFill>
-                  <a:schemeClr val="tx1"/>
-                </a:solidFill>
-                <a:latin typeface="+mn-lt"/>
-                <a:ea typeface="+mn-ea"/>
-                <a:cs typeface="+mn-cs"/>
-              </a:defRPr>
-            </a:lvl7pPr>
-            <a:lvl8pPr marL="3429000" indent="-228600" algn="l" defTabSz="914400" rtl="0" eaLnBrk="1" latinLnBrk="0" hangingPunct="1">
-              <a:lnSpc>
-                <a:spcPct val="90000"/>
-              </a:lnSpc>
-              <a:spcBef>
-                <a:spcPts val="500"/>
-              </a:spcBef>
-              <a:buFont typeface="Arial" panose="020B0604020202020204" pitchFamily="34" charset="0"/>
-              <a:buChar char="•"/>
-              <a:defRPr sz="1800" kern="1200">
-                <a:solidFill>
-                  <a:schemeClr val="tx1"/>
-                </a:solidFill>
-                <a:latin typeface="+mn-lt"/>
-                <a:ea typeface="+mn-ea"/>
-                <a:cs typeface="+mn-cs"/>
-              </a:defRPr>
-            </a:lvl8pPr>
-            <a:lvl9pPr marL="3886200" indent="-228600" algn="l" defTabSz="914400" rtl="0" eaLnBrk="1" latinLnBrk="0" hangingPunct="1">
-              <a:lnSpc>
-                <a:spcPct val="90000"/>
-              </a:lnSpc>
-              <a:spcBef>
-                <a:spcPts val="500"/>
-              </a:spcBef>
-              <a:buFont typeface="Arial" panose="020B0604020202020204" pitchFamily="34" charset="0"/>
-              <a:buChar char="•"/>
-              <a:defRPr sz="1800" kern="1200">
-                <a:solidFill>
-                  <a:schemeClr val="tx1"/>
-                </a:solidFill>
-                <a:latin typeface="+mn-lt"/>
-                <a:ea typeface="+mn-ea"/>
-                <a:cs typeface="+mn-cs"/>
-              </a:defRPr>
-            </a:lvl9pPr>
-          </a:lstStyle>
-          <a:p>
-            <a:pPr marL="0" indent="0">
-              <a:buNone/>
-            </a:pPr>
-            <a:r>
-              <a:rPr lang="de-DE" dirty="0" err="1">
-                <a:solidFill>
-                  <a:srgbClr val="FF0000"/>
-                </a:solidFill>
-              </a:rPr>
-              <a:t>wallow</a:t>
-            </a:r>
-            <a:endParaRPr lang="de-CH" sz="2000" dirty="0"/>
-          </a:p>
-        </p:txBody>
-      </p:sp>
-      <p:pic>
-        <p:nvPicPr>
-          <p:cNvPr id="11" name="Grafik 10" descr="Ein Bild, das Gras, draußen, Heu, Pflanze enthält.&#10;&#10;Automatisch generierte Beschreibung">
-            <a:extLst>
-              <a:ext uri="{FF2B5EF4-FFF2-40B4-BE49-F238E27FC236}">
-                <a16:creationId xmlns:a16="http://schemas.microsoft.com/office/drawing/2014/main" id="{6FCF2D30-7191-4A13-B2AF-AF8040C515C6}"/>
-              </a:ext>
-            </a:extLst>
-          </p:cNvPr>
-          <p:cNvPicPr>
-            <a:picLocks noChangeAspect="1"/>
-          </p:cNvPicPr>
-          <p:nvPr/>
-        </p:nvPicPr>
-        <p:blipFill>
-          <a:blip r:embed="rId3">
-            <a:extLst>
-              <a:ext uri="{28A0092B-C50C-407E-A947-70E740481C1C}">
-                <a14:useLocalDpi xmlns:a14="http://schemas.microsoft.com/office/drawing/2010/main" val="0"/>
-              </a:ext>
-            </a:extLst>
-          </a:blip>
-          <a:stretch>
-            <a:fillRect/>
-          </a:stretch>
-        </p:blipFill>
-        <p:spPr>
-          <a:xfrm>
-            <a:off x="6038654" y="493149"/>
-            <a:ext cx="3562545" cy="2664951"/>
-          </a:xfrm>
-          <a:prstGeom prst="rect">
-            <a:avLst/>
-          </a:prstGeom>
-        </p:spPr>
-      </p:pic>
-      <p:sp>
-        <p:nvSpPr>
-          <p:cNvPr id="12" name="Inhaltsplatzhalter 2">
-            <a:extLst>
-              <a:ext uri="{FF2B5EF4-FFF2-40B4-BE49-F238E27FC236}">
-                <a16:creationId xmlns:a16="http://schemas.microsoft.com/office/drawing/2014/main" id="{0313FA6F-1FA9-46E4-B102-B61ACE2B4021}"/>
-              </a:ext>
-            </a:extLst>
-          </p:cNvPr>
-          <p:cNvSpPr txBox="1">
-            <a:spLocks/>
-          </p:cNvSpPr>
-          <p:nvPr/>
-        </p:nvSpPr>
-        <p:spPr>
-          <a:xfrm>
-            <a:off x="6038654" y="3256121"/>
-            <a:ext cx="1752600" cy="466595"/>
-          </a:xfrm>
-          <a:prstGeom prst="rect">
-            <a:avLst/>
-          </a:prstGeom>
-        </p:spPr>
-        <p:txBody>
-          <a:bodyPr vert="horz" lIns="91440" tIns="45720" rIns="91440" bIns="45720" rtlCol="0">
-            <a:normAutofit lnSpcReduction="10000"/>
-          </a:bodyPr>
-          <a:lstStyle>
-            <a:lvl1pPr marL="228600" indent="-228600" algn="l" defTabSz="914400" rtl="0" eaLnBrk="1" latinLnBrk="0" hangingPunct="1">
-              <a:lnSpc>
-                <a:spcPct val="90000"/>
-              </a:lnSpc>
-              <a:spcBef>
-                <a:spcPts val="1000"/>
-              </a:spcBef>
-              <a:buFont typeface="Arial" panose="020B0604020202020204" pitchFamily="34" charset="0"/>
-              <a:buChar char="•"/>
-              <a:defRPr sz="2800" kern="1200">
-                <a:solidFill>
-                  <a:schemeClr val="tx1"/>
-                </a:solidFill>
-                <a:latin typeface="+mn-lt"/>
-                <a:ea typeface="+mn-ea"/>
-                <a:cs typeface="+mn-cs"/>
-              </a:defRPr>
-            </a:lvl1pPr>
-            <a:lvl2pPr marL="685800" indent="-228600" algn="l" defTabSz="914400" rtl="0" eaLnBrk="1" latinLnBrk="0" hangingPunct="1">
-              <a:lnSpc>
-                <a:spcPct val="90000"/>
-              </a:lnSpc>
-              <a:spcBef>
-                <a:spcPts val="500"/>
-              </a:spcBef>
-              <a:buFont typeface="Arial" panose="020B0604020202020204" pitchFamily="34" charset="0"/>
-              <a:buChar char="•"/>
-              <a:defRPr sz="2400" kern="1200">
-                <a:solidFill>
-                  <a:schemeClr val="tx1"/>
-                </a:solidFill>
-                <a:latin typeface="+mn-lt"/>
-                <a:ea typeface="+mn-ea"/>
-                <a:cs typeface="+mn-cs"/>
-              </a:defRPr>
-            </a:lvl2pPr>
-            <a:lvl3pPr marL="1143000" indent="-228600" algn="l" defTabSz="914400" rtl="0" eaLnBrk="1" latinLnBrk="0" hangingPunct="1">
-              <a:lnSpc>
-                <a:spcPct val="90000"/>
-              </a:lnSpc>
-              <a:spcBef>
-                <a:spcPts val="500"/>
-              </a:spcBef>
-              <a:buFont typeface="Arial" panose="020B0604020202020204" pitchFamily="34" charset="0"/>
-              <a:buChar char="•"/>
-              <a:defRPr sz="2000" kern="1200">
-                <a:solidFill>
-                  <a:schemeClr val="tx1"/>
-                </a:solidFill>
-                <a:latin typeface="+mn-lt"/>
-                <a:ea typeface="+mn-ea"/>
-                <a:cs typeface="+mn-cs"/>
-              </a:defRPr>
-            </a:lvl3pPr>
-            <a:lvl4pPr marL="1600200" indent="-228600" algn="l" defTabSz="914400" rtl="0" eaLnBrk="1" latinLnBrk="0" hangingPunct="1">
-              <a:lnSpc>
-                <a:spcPct val="90000"/>
-              </a:lnSpc>
-              <a:spcBef>
-                <a:spcPts val="500"/>
-              </a:spcBef>
-              <a:buFont typeface="Arial" panose="020B0604020202020204" pitchFamily="34" charset="0"/>
-              <a:buChar char="•"/>
-              <a:defRPr sz="1800" kern="1200">
-                <a:solidFill>
-                  <a:schemeClr val="tx1"/>
-                </a:solidFill>
-                <a:latin typeface="+mn-lt"/>
-                <a:ea typeface="+mn-ea"/>
-                <a:cs typeface="+mn-cs"/>
-              </a:defRPr>
-            </a:lvl4pPr>
-            <a:lvl5pPr marL="2057400" indent="-228600" algn="l" defTabSz="914400" rtl="0" eaLnBrk="1" latinLnBrk="0" hangingPunct="1">
-              <a:lnSpc>
-                <a:spcPct val="90000"/>
-              </a:lnSpc>
-              <a:spcBef>
-                <a:spcPts val="500"/>
-              </a:spcBef>
-              <a:buFont typeface="Arial" panose="020B0604020202020204" pitchFamily="34" charset="0"/>
-              <a:buChar char="•"/>
-              <a:defRPr sz="1800" kern="1200">
-                <a:solidFill>
-                  <a:schemeClr val="tx1"/>
-                </a:solidFill>
-                <a:latin typeface="+mn-lt"/>
-                <a:ea typeface="+mn-ea"/>
-                <a:cs typeface="+mn-cs"/>
-              </a:defRPr>
-            </a:lvl5pPr>
-            <a:lvl6pPr marL="2514600" indent="-228600" algn="l" defTabSz="914400" rtl="0" eaLnBrk="1" latinLnBrk="0" hangingPunct="1">
-              <a:lnSpc>
-                <a:spcPct val="90000"/>
-              </a:lnSpc>
-              <a:spcBef>
-                <a:spcPts val="500"/>
-              </a:spcBef>
-              <a:buFont typeface="Arial" panose="020B0604020202020204" pitchFamily="34" charset="0"/>
-              <a:buChar char="•"/>
-              <a:defRPr sz="1800" kern="1200">
-                <a:solidFill>
-                  <a:schemeClr val="tx1"/>
-                </a:solidFill>
-                <a:latin typeface="+mn-lt"/>
-                <a:ea typeface="+mn-ea"/>
-                <a:cs typeface="+mn-cs"/>
-              </a:defRPr>
-            </a:lvl6pPr>
-            <a:lvl7pPr marL="2971800" indent="-228600" algn="l" defTabSz="914400" rtl="0" eaLnBrk="1" latinLnBrk="0" hangingPunct="1">
-              <a:lnSpc>
-                <a:spcPct val="90000"/>
-              </a:lnSpc>
-              <a:spcBef>
-                <a:spcPts val="500"/>
-              </a:spcBef>
-              <a:buFont typeface="Arial" panose="020B0604020202020204" pitchFamily="34" charset="0"/>
-              <a:buChar char="•"/>
-              <a:defRPr sz="1800" kern="1200">
-                <a:solidFill>
-                  <a:schemeClr val="tx1"/>
-                </a:solidFill>
-                <a:latin typeface="+mn-lt"/>
-                <a:ea typeface="+mn-ea"/>
-                <a:cs typeface="+mn-cs"/>
-              </a:defRPr>
-            </a:lvl7pPr>
-            <a:lvl8pPr marL="3429000" indent="-228600" algn="l" defTabSz="914400" rtl="0" eaLnBrk="1" latinLnBrk="0" hangingPunct="1">
-              <a:lnSpc>
-                <a:spcPct val="90000"/>
-              </a:lnSpc>
-              <a:spcBef>
-                <a:spcPts val="500"/>
-              </a:spcBef>
-              <a:buFont typeface="Arial" panose="020B0604020202020204" pitchFamily="34" charset="0"/>
-              <a:buChar char="•"/>
-              <a:defRPr sz="1800" kern="1200">
-                <a:solidFill>
-                  <a:schemeClr val="tx1"/>
-                </a:solidFill>
-                <a:latin typeface="+mn-lt"/>
-                <a:ea typeface="+mn-ea"/>
-                <a:cs typeface="+mn-cs"/>
-              </a:defRPr>
-            </a:lvl8pPr>
-            <a:lvl9pPr marL="3886200" indent="-228600" algn="l" defTabSz="914400" rtl="0" eaLnBrk="1" latinLnBrk="0" hangingPunct="1">
-              <a:lnSpc>
-                <a:spcPct val="90000"/>
-              </a:lnSpc>
-              <a:spcBef>
-                <a:spcPts val="500"/>
-              </a:spcBef>
-              <a:buFont typeface="Arial" panose="020B0604020202020204" pitchFamily="34" charset="0"/>
-              <a:buChar char="•"/>
-              <a:defRPr sz="1800" kern="1200">
-                <a:solidFill>
-                  <a:schemeClr val="tx1"/>
-                </a:solidFill>
-                <a:latin typeface="+mn-lt"/>
-                <a:ea typeface="+mn-ea"/>
-                <a:cs typeface="+mn-cs"/>
-              </a:defRPr>
-            </a:lvl9pPr>
-          </a:lstStyle>
-          <a:p>
-            <a:pPr marL="0" indent="0">
-              <a:buNone/>
-            </a:pPr>
-            <a:r>
-              <a:rPr lang="de-DE" dirty="0" err="1">
-                <a:solidFill>
-                  <a:srgbClr val="FF0000"/>
-                </a:solidFill>
-              </a:rPr>
-              <a:t>nest</a:t>
-            </a:r>
-            <a:endParaRPr lang="de-CH" sz="2000" dirty="0"/>
-          </a:p>
-        </p:txBody>
-      </p:sp>
-    </p:spTree>
-    <p:extLst>
-      <p:ext uri="{BB962C8B-B14F-4D97-AF65-F5344CB8AC3E}">
-        <p14:creationId xmlns:p14="http://schemas.microsoft.com/office/powerpoint/2010/main" val="895728551"/>
-      </p:ext>
-    </p:extLst>
-  </p:cSld>
-  <p:clrMapOvr>
-    <a:masterClrMapping/>
-  </p:clrMapOvr>
-</p:sld>
-</file>
-
-<file path=ppt/slides/slide3.xml><?xml version="1.0" encoding="utf-8"?>
-<p:sld xmlns:a="http://schemas.openxmlformats.org/drawingml/2006/main" xmlns:r="http://schemas.openxmlformats.org/officeDocument/2006/relationships" xmlns:p="http://schemas.openxmlformats.org/presentationml/2006/main">
-  <p:cSld>
-    <p:spTree>
-      <p:nvGrpSpPr>
-        <p:cNvPr id="1" name=""/>
-        <p:cNvGrpSpPr/>
-        <p:nvPr/>
-      </p:nvGrpSpPr>
-      <p:grpSpPr>
-        <a:xfrm>
-          <a:off x="0" y="0"/>
-          <a:ext cx="0" cy="0"/>
-          <a:chOff x="0" y="0"/>
-          <a:chExt cx="0" cy="0"/>
-        </a:xfrm>
-      </p:grpSpPr>
-      <p:sp>
-        <p:nvSpPr>
-          <p:cNvPr id="2" name="Titel 1">
-            <a:extLst>
-              <a:ext uri="{FF2B5EF4-FFF2-40B4-BE49-F238E27FC236}">
-                <a16:creationId xmlns:a16="http://schemas.microsoft.com/office/drawing/2014/main" id="{EA022BEC-5F5D-47AF-8A2D-4720FC478896}"/>
-              </a:ext>
-            </a:extLst>
-          </p:cNvPr>
-          <p:cNvSpPr>
-            <a:spLocks noGrp="1"/>
-          </p:cNvSpPr>
-          <p:nvPr>
-            <p:ph type="title"/>
-          </p:nvPr>
-        </p:nvSpPr>
-        <p:spPr/>
-        <p:txBody>
-          <a:bodyPr/>
-          <a:lstStyle/>
-          <a:p>
-            <a:r>
-              <a:rPr lang="de-DE" dirty="0"/>
-              <a:t>Research </a:t>
-            </a:r>
-            <a:r>
-              <a:rPr lang="de-DE" dirty="0" err="1"/>
-              <a:t>questions</a:t>
-            </a:r>
-            <a:endParaRPr lang="de-CH" dirty="0"/>
-          </a:p>
-        </p:txBody>
-      </p:sp>
-      <p:sp>
-        <p:nvSpPr>
-          <p:cNvPr id="3" name="Inhaltsplatzhalter 2">
-            <a:extLst>
-              <a:ext uri="{FF2B5EF4-FFF2-40B4-BE49-F238E27FC236}">
-                <a16:creationId xmlns:a16="http://schemas.microsoft.com/office/drawing/2014/main" id="{B7CE67D2-1EF9-4A52-8755-43D2F9955D83}"/>
-              </a:ext>
-            </a:extLst>
-          </p:cNvPr>
-          <p:cNvSpPr>
-            <a:spLocks noGrp="1"/>
-          </p:cNvSpPr>
-          <p:nvPr>
-            <p:ph idx="1"/>
-          </p:nvPr>
-        </p:nvSpPr>
-        <p:spPr/>
-        <p:txBody>
-          <a:bodyPr/>
-          <a:lstStyle/>
-          <a:p>
-            <a:r>
-              <a:rPr lang="en-GB" dirty="0"/>
-              <a:t>How can resting sites be modelled based on spatiotemporal movement data?</a:t>
-            </a:r>
-            <a:endParaRPr lang="de-CH" dirty="0"/>
-          </a:p>
-          <a:p>
-            <a:r>
-              <a:rPr lang="en-GB" dirty="0"/>
-              <a:t>Can locations frequently visited by wild boar be determined efficiently and effectively in the provided research data?</a:t>
-            </a:r>
-            <a:endParaRPr lang="de-CH" dirty="0"/>
-          </a:p>
-          <a:p>
-            <a:r>
-              <a:rPr lang="en-GB" dirty="0"/>
-              <a:t>Can these regular resting places be clearly defined as kettles or wallows?</a:t>
-            </a:r>
-            <a:endParaRPr lang="de-CH" dirty="0"/>
-          </a:p>
-          <a:p>
-            <a:pPr marL="0" indent="0">
-              <a:buNone/>
-            </a:pPr>
-            <a:r>
-              <a:rPr lang="de-CH" b="1" dirty="0"/>
-              <a:t>-&gt; Best possible </a:t>
-            </a:r>
-            <a:r>
-              <a:rPr lang="de-CH" b="1" dirty="0" err="1"/>
-              <a:t>outcome</a:t>
-            </a:r>
-            <a:r>
-              <a:rPr lang="de-CH" b="1" dirty="0"/>
-              <a:t>: </a:t>
-            </a:r>
-            <a:r>
-              <a:rPr lang="de-CH" dirty="0" err="1"/>
-              <a:t>destinction</a:t>
-            </a:r>
-            <a:r>
-              <a:rPr lang="de-CH" dirty="0"/>
-              <a:t> </a:t>
-            </a:r>
-            <a:r>
-              <a:rPr lang="de-CH" dirty="0" err="1"/>
-              <a:t>between</a:t>
-            </a:r>
-            <a:r>
-              <a:rPr lang="de-CH" dirty="0"/>
-              <a:t> </a:t>
-            </a:r>
-            <a:r>
-              <a:rPr lang="de-CH" dirty="0" err="1"/>
-              <a:t>kettles</a:t>
-            </a:r>
-            <a:r>
-              <a:rPr lang="de-CH" dirty="0"/>
-              <a:t> and </a:t>
-            </a:r>
-            <a:r>
-              <a:rPr lang="de-CH" dirty="0" err="1"/>
-              <a:t>wallows</a:t>
-            </a:r>
-            <a:endParaRPr lang="de-CH" dirty="0"/>
-          </a:p>
-        </p:txBody>
-      </p:sp>
-      <p:pic>
-        <p:nvPicPr>
-          <p:cNvPr id="4" name="Grafik 3">
-            <a:extLst>
-              <a:ext uri="{FF2B5EF4-FFF2-40B4-BE49-F238E27FC236}">
-                <a16:creationId xmlns:a16="http://schemas.microsoft.com/office/drawing/2014/main" id="{D0823300-16B2-40DC-AC1D-E7B7EC9CFD27}"/>
-              </a:ext>
-            </a:extLst>
-          </p:cNvPr>
-          <p:cNvPicPr>
-            <a:picLocks noChangeAspect="1"/>
-          </p:cNvPicPr>
-          <p:nvPr/>
-        </p:nvPicPr>
-        <p:blipFill rotWithShape="1">
-          <a:blip r:embed="rId2"/>
-          <a:srcRect b="43723"/>
-          <a:stretch/>
-        </p:blipFill>
-        <p:spPr>
-          <a:xfrm>
-            <a:off x="0" y="5285424"/>
-            <a:ext cx="12192000" cy="1572576"/>
+            <a:off x="7924800" y="1957050"/>
+            <a:ext cx="3945463" cy="3945463"/>
           </a:xfrm>
           <a:prstGeom prst="rect">
             <a:avLst/>
@@ -4819,540 +6121,12 @@
     </p:spTree>
     <p:extLst>
       <p:ext uri="{BB962C8B-B14F-4D97-AF65-F5344CB8AC3E}">
-        <p14:creationId xmlns:p14="http://schemas.microsoft.com/office/powerpoint/2010/main" val="1444707244"/>
-      </p:ext>
-    </p:extLst>
-  </p:cSld>
-  <p:clrMapOvr>
-    <a:masterClrMapping/>
-  </p:clrMapOvr>
-</p:sld>
-</file>
-
-<file path=ppt/slides/slide4.xml><?xml version="1.0" encoding="utf-8"?>
-<p:sld xmlns:a="http://schemas.openxmlformats.org/drawingml/2006/main" xmlns:r="http://schemas.openxmlformats.org/officeDocument/2006/relationships" xmlns:p="http://schemas.openxmlformats.org/presentationml/2006/main">
-  <p:cSld>
-    <p:spTree>
-      <p:nvGrpSpPr>
-        <p:cNvPr id="1" name=""/>
-        <p:cNvGrpSpPr/>
-        <p:nvPr/>
-      </p:nvGrpSpPr>
-      <p:grpSpPr>
-        <a:xfrm>
-          <a:off x="0" y="0"/>
-          <a:ext cx="0" cy="0"/>
-          <a:chOff x="0" y="0"/>
-          <a:chExt cx="0" cy="0"/>
-        </a:xfrm>
-      </p:grpSpPr>
-      <p:sp>
-        <p:nvSpPr>
-          <p:cNvPr id="2" name="Titel 1">
-            <a:extLst>
-              <a:ext uri="{FF2B5EF4-FFF2-40B4-BE49-F238E27FC236}">
-                <a16:creationId xmlns:a16="http://schemas.microsoft.com/office/drawing/2014/main" id="{001B5CE5-958C-4D36-BE3C-932591C7F947}"/>
-              </a:ext>
-            </a:extLst>
-          </p:cNvPr>
-          <p:cNvSpPr>
-            <a:spLocks noGrp="1"/>
-          </p:cNvSpPr>
-          <p:nvPr>
-            <p:ph type="title"/>
-          </p:nvPr>
-        </p:nvSpPr>
-        <p:spPr/>
-        <p:txBody>
-          <a:bodyPr/>
-          <a:lstStyle/>
-          <a:p>
-            <a:r>
-              <a:rPr lang="de-CH" dirty="0"/>
-              <a:t>Research plan &amp; </a:t>
-            </a:r>
-            <a:r>
-              <a:rPr lang="de-CH" dirty="0" err="1"/>
-              <a:t>Preliminary</a:t>
-            </a:r>
-            <a:r>
-              <a:rPr lang="de-CH" dirty="0"/>
-              <a:t> </a:t>
-            </a:r>
-            <a:r>
-              <a:rPr lang="de-CH" dirty="0" err="1"/>
-              <a:t>results</a:t>
-            </a:r>
-            <a:endParaRPr lang="de-CH" dirty="0"/>
-          </a:p>
-        </p:txBody>
-      </p:sp>
-      <p:sp>
-        <p:nvSpPr>
-          <p:cNvPr id="3" name="Inhaltsplatzhalter 2">
-            <a:extLst>
-              <a:ext uri="{FF2B5EF4-FFF2-40B4-BE49-F238E27FC236}">
-                <a16:creationId xmlns:a16="http://schemas.microsoft.com/office/drawing/2014/main" id="{D536A0EC-C227-468B-8F2F-698DB635DD5D}"/>
-              </a:ext>
-            </a:extLst>
-          </p:cNvPr>
-          <p:cNvSpPr>
-            <a:spLocks noGrp="1"/>
-          </p:cNvSpPr>
-          <p:nvPr>
-            <p:ph idx="1"/>
-          </p:nvPr>
-        </p:nvSpPr>
-        <p:spPr/>
-        <p:txBody>
-          <a:bodyPr/>
-          <a:lstStyle/>
-          <a:p>
-            <a:r>
-              <a:rPr lang="de-DE" dirty="0"/>
-              <a:t>Segmentation </a:t>
-            </a:r>
-            <a:r>
-              <a:rPr lang="de-DE" dirty="0" err="1"/>
-              <a:t>of</a:t>
-            </a:r>
-            <a:r>
-              <a:rPr lang="de-DE" dirty="0"/>
-              <a:t> </a:t>
-            </a:r>
-            <a:r>
-              <a:rPr lang="de-DE" dirty="0" err="1"/>
-              <a:t>movement</a:t>
-            </a:r>
-            <a:r>
-              <a:rPr lang="de-DE" dirty="0"/>
-              <a:t> </a:t>
-            </a:r>
-            <a:r>
-              <a:rPr lang="de-DE" dirty="0" err="1"/>
-              <a:t>data</a:t>
-            </a:r>
-            <a:r>
-              <a:rPr lang="de-DE" dirty="0"/>
-              <a:t> (</a:t>
-            </a:r>
-            <a:r>
-              <a:rPr lang="de-DE" dirty="0" err="1"/>
-              <a:t>criterias</a:t>
-            </a:r>
-            <a:r>
-              <a:rPr lang="de-DE" dirty="0"/>
-              <a:t> like </a:t>
-            </a:r>
-            <a:r>
-              <a:rPr lang="de-DE" dirty="0" err="1"/>
-              <a:t>speed</a:t>
-            </a:r>
-            <a:r>
-              <a:rPr lang="de-DE" dirty="0"/>
-              <a:t>, </a:t>
-            </a:r>
-            <a:r>
-              <a:rPr lang="de-DE" dirty="0" err="1"/>
-              <a:t>step</a:t>
-            </a:r>
-            <a:r>
-              <a:rPr lang="de-DE" dirty="0"/>
-              <a:t> </a:t>
-            </a:r>
-            <a:r>
-              <a:rPr lang="de-DE" dirty="0" err="1"/>
-              <a:t>length</a:t>
-            </a:r>
-            <a:r>
-              <a:rPr lang="de-DE" dirty="0"/>
-              <a:t>)</a:t>
-            </a:r>
-          </a:p>
-          <a:p>
-            <a:r>
-              <a:rPr lang="de-DE" dirty="0"/>
-              <a:t>Annotation </a:t>
-            </a:r>
-            <a:r>
-              <a:rPr lang="de-DE" dirty="0" err="1"/>
-              <a:t>of</a:t>
-            </a:r>
-            <a:r>
-              <a:rPr lang="de-DE" dirty="0"/>
-              <a:t> </a:t>
-            </a:r>
-            <a:r>
-              <a:rPr lang="de-DE" dirty="0" err="1"/>
-              <a:t>status</a:t>
-            </a:r>
-            <a:r>
-              <a:rPr lang="de-DE" dirty="0"/>
-              <a:t>:</a:t>
-            </a:r>
-          </a:p>
-          <a:p>
-            <a:pPr lvl="1"/>
-            <a:r>
-              <a:rPr lang="de-DE" dirty="0" err="1"/>
-              <a:t>Resting</a:t>
-            </a:r>
-            <a:endParaRPr lang="de-DE" dirty="0"/>
-          </a:p>
-          <a:p>
-            <a:pPr lvl="1"/>
-            <a:r>
-              <a:rPr lang="de-DE" dirty="0"/>
-              <a:t>Moving</a:t>
-            </a:r>
-          </a:p>
-          <a:p>
-            <a:pPr lvl="1"/>
-            <a:r>
-              <a:rPr lang="de-DE" dirty="0" err="1"/>
-              <a:t>Feeding</a:t>
-            </a:r>
-            <a:endParaRPr lang="de-DE" dirty="0"/>
-          </a:p>
-          <a:p>
-            <a:pPr lvl="1"/>
-            <a:r>
-              <a:rPr lang="de-DE" dirty="0" err="1"/>
-              <a:t>Unclear</a:t>
-            </a:r>
-            <a:endParaRPr lang="de-CH" dirty="0"/>
-          </a:p>
-          <a:p>
-            <a:r>
-              <a:rPr lang="de-CH" dirty="0" err="1"/>
-              <a:t>Spatial</a:t>
-            </a:r>
-            <a:r>
-              <a:rPr lang="de-CH" dirty="0"/>
-              <a:t> </a:t>
-            </a:r>
-            <a:r>
-              <a:rPr lang="de-CH" dirty="0" err="1"/>
-              <a:t>join</a:t>
-            </a:r>
-            <a:r>
-              <a:rPr lang="de-CH" dirty="0"/>
-              <a:t> (</a:t>
-            </a:r>
-            <a:r>
-              <a:rPr lang="de-CH" dirty="0" err="1"/>
-              <a:t>land</a:t>
-            </a:r>
-            <a:r>
-              <a:rPr lang="de-CH" dirty="0"/>
-              <a:t> </a:t>
-            </a:r>
-            <a:r>
-              <a:rPr lang="de-CH" dirty="0" err="1"/>
-              <a:t>use</a:t>
-            </a:r>
-            <a:r>
-              <a:rPr lang="de-CH" dirty="0"/>
-              <a:t> and </a:t>
-            </a:r>
-            <a:r>
-              <a:rPr lang="de-CH" dirty="0" err="1"/>
-              <a:t>vegetation</a:t>
-            </a:r>
-            <a:r>
-              <a:rPr lang="de-CH" dirty="0"/>
-              <a:t> type)</a:t>
-            </a:r>
-          </a:p>
-          <a:p>
-            <a:r>
-              <a:rPr lang="de-CH" dirty="0" err="1"/>
-              <a:t>Allocation</a:t>
-            </a:r>
-            <a:r>
-              <a:rPr lang="de-CH" dirty="0"/>
-              <a:t> </a:t>
-            </a:r>
-            <a:r>
-              <a:rPr lang="de-CH" dirty="0" err="1"/>
-              <a:t>of</a:t>
-            </a:r>
-            <a:r>
-              <a:rPr lang="de-CH" dirty="0"/>
-              <a:t> </a:t>
-            </a:r>
-            <a:r>
-              <a:rPr lang="de-CH" dirty="0" err="1"/>
-              <a:t>wallows</a:t>
-            </a:r>
-            <a:r>
-              <a:rPr lang="de-CH" dirty="0"/>
-              <a:t> and </a:t>
-            </a:r>
-            <a:r>
-              <a:rPr lang="de-CH" dirty="0" err="1"/>
-              <a:t>kettles</a:t>
-            </a:r>
-            <a:endParaRPr lang="de-CH" dirty="0"/>
-          </a:p>
-          <a:p>
-            <a:r>
-              <a:rPr lang="de-CH" dirty="0" err="1"/>
-              <a:t>Visualisation</a:t>
-            </a:r>
-            <a:r>
-              <a:rPr lang="de-CH" dirty="0"/>
-              <a:t> </a:t>
-            </a:r>
-            <a:r>
-              <a:rPr lang="de-CH" dirty="0" err="1"/>
-              <a:t>of</a:t>
-            </a:r>
-            <a:r>
-              <a:rPr lang="de-CH" dirty="0"/>
-              <a:t> </a:t>
-            </a:r>
-            <a:r>
-              <a:rPr lang="de-CH" dirty="0" err="1"/>
-              <a:t>results</a:t>
-            </a:r>
-            <a:r>
-              <a:rPr lang="de-CH" dirty="0"/>
-              <a:t> </a:t>
-            </a:r>
-            <a:r>
-              <a:rPr lang="de-CH" dirty="0" err="1"/>
-              <a:t>as</a:t>
-            </a:r>
-            <a:r>
-              <a:rPr lang="de-CH" dirty="0"/>
-              <a:t> </a:t>
-            </a:r>
-            <a:r>
-              <a:rPr lang="de-CH" dirty="0" err="1"/>
-              <a:t>convex</a:t>
-            </a:r>
-            <a:r>
-              <a:rPr lang="de-CH" dirty="0"/>
-              <a:t> </a:t>
-            </a:r>
-            <a:r>
-              <a:rPr lang="de-CH" dirty="0" err="1"/>
-              <a:t>hull</a:t>
-            </a:r>
-            <a:endParaRPr lang="de-CH" dirty="0"/>
-          </a:p>
-        </p:txBody>
-      </p:sp>
-      <p:pic>
-        <p:nvPicPr>
-          <p:cNvPr id="4" name="Grafik 3">
-            <a:extLst>
-              <a:ext uri="{FF2B5EF4-FFF2-40B4-BE49-F238E27FC236}">
-                <a16:creationId xmlns:a16="http://schemas.microsoft.com/office/drawing/2014/main" id="{B825669A-0520-45A8-ADA3-F6BF1264945F}"/>
-              </a:ext>
-            </a:extLst>
-          </p:cNvPr>
-          <p:cNvPicPr>
-            <a:picLocks noChangeAspect="1"/>
-          </p:cNvPicPr>
-          <p:nvPr/>
-        </p:nvPicPr>
-        <p:blipFill rotWithShape="1">
-          <a:blip r:embed="rId2"/>
-          <a:srcRect l="7282" r="14600"/>
-          <a:stretch/>
-        </p:blipFill>
-        <p:spPr>
-          <a:xfrm>
-            <a:off x="7449841" y="2506662"/>
-            <a:ext cx="4742159" cy="4351338"/>
-          </a:xfrm>
-          <a:prstGeom prst="rect">
-            <a:avLst/>
-          </a:prstGeom>
-        </p:spPr>
-      </p:pic>
-    </p:spTree>
-    <p:extLst>
-      <p:ext uri="{BB962C8B-B14F-4D97-AF65-F5344CB8AC3E}">
-        <p14:creationId xmlns:p14="http://schemas.microsoft.com/office/powerpoint/2010/main" val="439354833"/>
-      </p:ext>
-    </p:extLst>
-  </p:cSld>
-  <p:clrMapOvr>
-    <a:masterClrMapping/>
-  </p:clrMapOvr>
-</p:sld>
-</file>
-
-<file path=ppt/slides/slide5.xml><?xml version="1.0" encoding="utf-8"?>
-<p:sld xmlns:a="http://schemas.openxmlformats.org/drawingml/2006/main" xmlns:r="http://schemas.openxmlformats.org/officeDocument/2006/relationships" xmlns:p="http://schemas.openxmlformats.org/presentationml/2006/main">
-  <p:cSld>
-    <p:spTree>
-      <p:nvGrpSpPr>
-        <p:cNvPr id="1" name=""/>
-        <p:cNvGrpSpPr/>
-        <p:nvPr/>
-      </p:nvGrpSpPr>
-      <p:grpSpPr>
-        <a:xfrm>
-          <a:off x="0" y="0"/>
-          <a:ext cx="0" cy="0"/>
-          <a:chOff x="0" y="0"/>
-          <a:chExt cx="0" cy="0"/>
-        </a:xfrm>
-      </p:grpSpPr>
-      <p:sp>
-        <p:nvSpPr>
-          <p:cNvPr id="2" name="Titel 1">
-            <a:extLst>
-              <a:ext uri="{FF2B5EF4-FFF2-40B4-BE49-F238E27FC236}">
-                <a16:creationId xmlns:a16="http://schemas.microsoft.com/office/drawing/2014/main" id="{D6066F6D-6130-465C-886F-BF7728193B40}"/>
-              </a:ext>
-            </a:extLst>
-          </p:cNvPr>
-          <p:cNvSpPr>
-            <a:spLocks noGrp="1"/>
-          </p:cNvSpPr>
-          <p:nvPr>
-            <p:ph type="title"/>
-          </p:nvPr>
-        </p:nvSpPr>
-        <p:spPr/>
-        <p:txBody>
-          <a:bodyPr/>
-          <a:lstStyle/>
-          <a:p>
-            <a:r>
-              <a:rPr lang="en-US" dirty="0"/>
-              <a:t>Encountered problems and ideas for plan B</a:t>
-            </a:r>
-            <a:endParaRPr lang="de-CH" dirty="0"/>
-          </a:p>
-        </p:txBody>
-      </p:sp>
-      <p:sp>
-        <p:nvSpPr>
-          <p:cNvPr id="3" name="Inhaltsplatzhalter 2">
-            <a:extLst>
-              <a:ext uri="{FF2B5EF4-FFF2-40B4-BE49-F238E27FC236}">
-                <a16:creationId xmlns:a16="http://schemas.microsoft.com/office/drawing/2014/main" id="{98C39DE5-9BA2-411F-9E02-8CAC33776A3F}"/>
-              </a:ext>
-            </a:extLst>
-          </p:cNvPr>
-          <p:cNvSpPr>
-            <a:spLocks noGrp="1"/>
-          </p:cNvSpPr>
-          <p:nvPr>
-            <p:ph idx="1"/>
-          </p:nvPr>
-        </p:nvSpPr>
-        <p:spPr/>
-        <p:txBody>
-          <a:bodyPr/>
-          <a:lstStyle/>
-          <a:p>
-            <a:r>
-              <a:rPr lang="de-DE" dirty="0" err="1"/>
-              <a:t>Finding</a:t>
-            </a:r>
-            <a:r>
-              <a:rPr lang="de-DE" dirty="0"/>
-              <a:t> </a:t>
-            </a:r>
-            <a:r>
-              <a:rPr lang="de-DE" dirty="0" err="1"/>
-              <a:t>clear</a:t>
-            </a:r>
-            <a:r>
-              <a:rPr lang="de-DE" dirty="0"/>
-              <a:t> </a:t>
-            </a:r>
-            <a:r>
-              <a:rPr lang="de-DE" dirty="0" err="1"/>
-              <a:t>criterias</a:t>
-            </a:r>
-            <a:r>
-              <a:rPr lang="de-DE" dirty="0"/>
-              <a:t> </a:t>
-            </a:r>
-            <a:r>
-              <a:rPr lang="de-DE" dirty="0" err="1"/>
-              <a:t>for</a:t>
-            </a:r>
-            <a:r>
-              <a:rPr lang="de-DE" dirty="0"/>
-              <a:t> </a:t>
-            </a:r>
-            <a:r>
-              <a:rPr lang="de-DE" dirty="0" err="1"/>
-              <a:t>the</a:t>
-            </a:r>
-            <a:r>
-              <a:rPr lang="de-DE" dirty="0"/>
-              <a:t> </a:t>
-            </a:r>
-            <a:r>
-              <a:rPr lang="de-DE" dirty="0" err="1"/>
-              <a:t>distinction</a:t>
-            </a:r>
-            <a:r>
-              <a:rPr lang="de-DE" dirty="0"/>
-              <a:t> </a:t>
-            </a:r>
-            <a:r>
-              <a:rPr lang="de-DE" dirty="0" err="1"/>
-              <a:t>between</a:t>
-            </a:r>
-            <a:r>
-              <a:rPr lang="de-DE" dirty="0"/>
-              <a:t> </a:t>
-            </a:r>
-            <a:r>
-              <a:rPr lang="de-DE" dirty="0" err="1"/>
-              <a:t>nests</a:t>
-            </a:r>
-            <a:r>
-              <a:rPr lang="de-DE" dirty="0"/>
-              <a:t> and </a:t>
-            </a:r>
-            <a:r>
-              <a:rPr lang="de-DE" dirty="0" err="1"/>
-              <a:t>wallows</a:t>
-            </a:r>
-            <a:endParaRPr lang="de-DE" dirty="0"/>
-          </a:p>
-          <a:p>
-            <a:r>
-              <a:rPr lang="de-DE" dirty="0"/>
-              <a:t>Plan B: </a:t>
-            </a:r>
-            <a:r>
-              <a:rPr lang="de-DE" dirty="0" err="1"/>
-              <a:t>No</a:t>
-            </a:r>
-            <a:r>
-              <a:rPr lang="de-DE" dirty="0"/>
-              <a:t> </a:t>
-            </a:r>
-            <a:r>
-              <a:rPr lang="de-DE" dirty="0" err="1"/>
-              <a:t>differentiation</a:t>
-            </a:r>
-            <a:endParaRPr lang="de-DE" dirty="0"/>
-          </a:p>
-        </p:txBody>
-      </p:sp>
-    </p:spTree>
-    <p:extLst>
-      <p:ext uri="{BB962C8B-B14F-4D97-AF65-F5344CB8AC3E}">
         <p14:creationId xmlns:p14="http://schemas.microsoft.com/office/powerpoint/2010/main" val="2055926766"/>
       </p:ext>
     </p:extLst>
   </p:cSld>
   <p:clrMapOvr>
-    <a:masterClrMapping/>
+    <a:overrideClrMapping bg1="dk1" tx1="lt1" bg2="dk2" tx2="lt2" accent1="accent1" accent2="accent2" accent3="accent3" accent4="accent4" accent5="accent5" accent6="accent6" hlink="hlink" folHlink="folHlink"/>
   </p:clrMapOvr>
 </p:sld>
 </file>

</xml_diff>